<commit_message>
working on the TSE paper
</commit_message>
<xml_diff>
--- a/TSE/TSE_TEX/figs/figs.pptx
+++ b/TSE/TSE_TEX/figs/figs.pptx
@@ -9,13 +9,16 @@
     <p:sldId id="260" r:id="rId3"/>
     <p:sldId id="270" r:id="rId4"/>
     <p:sldId id="261" r:id="rId5"/>
-    <p:sldId id="257" r:id="rId6"/>
-    <p:sldId id="258" r:id="rId7"/>
-    <p:sldId id="259" r:id="rId8"/>
-    <p:sldId id="262" r:id="rId9"/>
-    <p:sldId id="264" r:id="rId10"/>
-    <p:sldId id="266" r:id="rId11"/>
-    <p:sldId id="269" r:id="rId12"/>
+    <p:sldId id="271" r:id="rId6"/>
+    <p:sldId id="257" r:id="rId7"/>
+    <p:sldId id="258" r:id="rId8"/>
+    <p:sldId id="259" r:id="rId9"/>
+    <p:sldId id="262" r:id="rId10"/>
+    <p:sldId id="264" r:id="rId11"/>
+    <p:sldId id="266" r:id="rId12"/>
+    <p:sldId id="273" r:id="rId13"/>
+    <p:sldId id="269" r:id="rId14"/>
+    <p:sldId id="272" r:id="rId15"/>
   </p:sldIdLst>
   <p:sldSz cx="12192000" cy="6858000"/>
   <p:notesSz cx="6858000" cy="9144000"/>
@@ -253,7 +256,7 @@
           <a:p>
             <a:fld id="{5A779009-EA30-43A9-A43B-F006CC3D9B84}" type="datetimeFigureOut">
               <a:rPr lang="en-US" smtClean="0"/>
-              <a:t>5/14/2017</a:t>
+              <a:t>9/24/2017</a:t>
             </a:fld>
             <a:endParaRPr lang="en-US"/>
           </a:p>
@@ -423,7 +426,7 @@
           <a:p>
             <a:fld id="{5A779009-EA30-43A9-A43B-F006CC3D9B84}" type="datetimeFigureOut">
               <a:rPr lang="en-US" smtClean="0"/>
-              <a:t>5/14/2017</a:t>
+              <a:t>9/24/2017</a:t>
             </a:fld>
             <a:endParaRPr lang="en-US"/>
           </a:p>
@@ -603,7 +606,7 @@
           <a:p>
             <a:fld id="{5A779009-EA30-43A9-A43B-F006CC3D9B84}" type="datetimeFigureOut">
               <a:rPr lang="en-US" smtClean="0"/>
-              <a:t>5/14/2017</a:t>
+              <a:t>9/24/2017</a:t>
             </a:fld>
             <a:endParaRPr lang="en-US"/>
           </a:p>
@@ -773,7 +776,7 @@
           <a:p>
             <a:fld id="{5A779009-EA30-43A9-A43B-F006CC3D9B84}" type="datetimeFigureOut">
               <a:rPr lang="en-US" smtClean="0"/>
-              <a:t>5/14/2017</a:t>
+              <a:t>9/24/2017</a:t>
             </a:fld>
             <a:endParaRPr lang="en-US"/>
           </a:p>
@@ -1019,7 +1022,7 @@
           <a:p>
             <a:fld id="{5A779009-EA30-43A9-A43B-F006CC3D9B84}" type="datetimeFigureOut">
               <a:rPr lang="en-US" smtClean="0"/>
-              <a:t>5/14/2017</a:t>
+              <a:t>9/24/2017</a:t>
             </a:fld>
             <a:endParaRPr lang="en-US"/>
           </a:p>
@@ -1251,7 +1254,7 @@
           <a:p>
             <a:fld id="{5A779009-EA30-43A9-A43B-F006CC3D9B84}" type="datetimeFigureOut">
               <a:rPr lang="en-US" smtClean="0"/>
-              <a:t>5/14/2017</a:t>
+              <a:t>9/24/2017</a:t>
             </a:fld>
             <a:endParaRPr lang="en-US"/>
           </a:p>
@@ -1618,7 +1621,7 @@
           <a:p>
             <a:fld id="{5A779009-EA30-43A9-A43B-F006CC3D9B84}" type="datetimeFigureOut">
               <a:rPr lang="en-US" smtClean="0"/>
-              <a:t>5/14/2017</a:t>
+              <a:t>9/24/2017</a:t>
             </a:fld>
             <a:endParaRPr lang="en-US"/>
           </a:p>
@@ -1736,7 +1739,7 @@
           <a:p>
             <a:fld id="{5A779009-EA30-43A9-A43B-F006CC3D9B84}" type="datetimeFigureOut">
               <a:rPr lang="en-US" smtClean="0"/>
-              <a:t>5/14/2017</a:t>
+              <a:t>9/24/2017</a:t>
             </a:fld>
             <a:endParaRPr lang="en-US"/>
           </a:p>
@@ -1831,7 +1834,7 @@
           <a:p>
             <a:fld id="{5A779009-EA30-43A9-A43B-F006CC3D9B84}" type="datetimeFigureOut">
               <a:rPr lang="en-US" smtClean="0"/>
-              <a:t>5/14/2017</a:t>
+              <a:t>9/24/2017</a:t>
             </a:fld>
             <a:endParaRPr lang="en-US"/>
           </a:p>
@@ -2108,7 +2111,7 @@
           <a:p>
             <a:fld id="{5A779009-EA30-43A9-A43B-F006CC3D9B84}" type="datetimeFigureOut">
               <a:rPr lang="en-US" smtClean="0"/>
-              <a:t>5/14/2017</a:t>
+              <a:t>9/24/2017</a:t>
             </a:fld>
             <a:endParaRPr lang="en-US"/>
           </a:p>
@@ -2361,7 +2364,7 @@
           <a:p>
             <a:fld id="{5A779009-EA30-43A9-A43B-F006CC3D9B84}" type="datetimeFigureOut">
               <a:rPr lang="en-US" smtClean="0"/>
-              <a:t>5/14/2017</a:t>
+              <a:t>9/24/2017</a:t>
             </a:fld>
             <a:endParaRPr lang="en-US"/>
           </a:p>
@@ -2574,7 +2577,7 @@
           <a:p>
             <a:fld id="{5A779009-EA30-43A9-A43B-F006CC3D9B84}" type="datetimeFigureOut">
               <a:rPr lang="en-US" smtClean="0"/>
-              <a:t>5/14/2017</a:t>
+              <a:t>9/24/2017</a:t>
             </a:fld>
             <a:endParaRPr lang="en-US"/>
           </a:p>
@@ -3047,113 +3050,223 @@
           <a:chExt cx="0" cy="0"/>
         </a:xfrm>
       </p:grpSpPr>
+      <p:grpSp>
+        <p:nvGrpSpPr>
+          <p:cNvPr id="5" name="Group 4"/>
+          <p:cNvGrpSpPr/>
+          <p:nvPr/>
+        </p:nvGrpSpPr>
+        <p:grpSpPr>
+          <a:xfrm>
+            <a:off x="228506" y="228015"/>
+            <a:ext cx="11553686" cy="6238816"/>
+            <a:chOff x="228506" y="228015"/>
+            <a:chExt cx="11553686" cy="6238816"/>
+          </a:xfrm>
+        </p:grpSpPr>
+        <p:pic>
+          <p:nvPicPr>
+            <p:cNvPr id="4" name="Picture 3"/>
+            <p:cNvPicPr>
+              <a:picLocks noChangeAspect="1"/>
+            </p:cNvPicPr>
+            <p:nvPr/>
+          </p:nvPicPr>
+          <p:blipFill rotWithShape="1">
+            <a:blip r:embed="rId2">
+              <a:extLst>
+                <a:ext uri="{28A0092B-C50C-407E-A947-70E740481C1C}">
+                  <a14:useLocalDpi xmlns:a14="http://schemas.microsoft.com/office/drawing/2010/main" val="0"/>
+                </a:ext>
+              </a:extLst>
+            </a:blip>
+            <a:srcRect l="1592" r="894" b="3052"/>
+            <a:stretch/>
+          </p:blipFill>
+          <p:spPr>
+            <a:xfrm>
+              <a:off x="567060" y="228015"/>
+              <a:ext cx="10929984" cy="6069539"/>
+            </a:xfrm>
+            <a:prstGeom prst="rect">
+              <a:avLst/>
+            </a:prstGeom>
+          </p:spPr>
+        </p:pic>
+        <p:pic>
+          <p:nvPicPr>
+            <p:cNvPr id="13" name="Picture 12"/>
+            <p:cNvPicPr>
+              <a:picLocks noChangeAspect="1"/>
+            </p:cNvPicPr>
+            <p:nvPr/>
+          </p:nvPicPr>
+          <p:blipFill>
+            <a:blip r:embed="rId3"/>
+            <a:stretch>
+              <a:fillRect/>
+            </a:stretch>
+          </p:blipFill>
+          <p:spPr>
+            <a:xfrm>
+              <a:off x="1052166" y="350221"/>
+              <a:ext cx="5595700" cy="2007498"/>
+            </a:xfrm>
+            <a:prstGeom prst="rect">
+              <a:avLst/>
+            </a:prstGeom>
+            <a:noFill/>
+          </p:spPr>
+        </p:pic>
+        <p:sp>
+          <p:nvSpPr>
+            <p:cNvPr id="15" name="Rectangle 14"/>
+            <p:cNvSpPr/>
+            <p:nvPr/>
+          </p:nvSpPr>
+          <p:spPr>
+            <a:xfrm rot="16200000">
+              <a:off x="10856907" y="2861552"/>
+              <a:ext cx="1419684" cy="430887"/>
+            </a:xfrm>
+            <a:prstGeom prst="rect">
+              <a:avLst/>
+            </a:prstGeom>
+            <a:noFill/>
+          </p:spPr>
+          <p:txBody>
+            <a:bodyPr wrap="none">
+              <a:spAutoFit/>
+            </a:bodyPr>
+            <a:lstStyle/>
+            <a:p>
+              <a:r>
+                <a:rPr lang="en-US" sz="2200" dirty="0" smtClean="0"/>
+                <a:t>#of  MIVCs</a:t>
+              </a:r>
+              <a:endParaRPr lang="en-US" sz="2200" dirty="0"/>
+            </a:p>
+          </p:txBody>
+        </p:sp>
+        <p:sp>
+          <p:nvSpPr>
+            <p:cNvPr id="22" name="Rectangle 21"/>
+            <p:cNvSpPr/>
+            <p:nvPr/>
+          </p:nvSpPr>
+          <p:spPr>
+            <a:xfrm>
+              <a:off x="5842837" y="6128277"/>
+              <a:ext cx="805029" cy="338554"/>
+            </a:xfrm>
+            <a:prstGeom prst="rect">
+              <a:avLst/>
+            </a:prstGeom>
+            <a:noFill/>
+          </p:spPr>
+          <p:txBody>
+            <a:bodyPr wrap="none">
+              <a:spAutoFit/>
+            </a:bodyPr>
+            <a:lstStyle/>
+            <a:p>
+              <a:r>
+                <a:rPr lang="en-US" sz="1600" dirty="0" smtClean="0"/>
+                <a:t>Models</a:t>
+              </a:r>
+              <a:endParaRPr lang="en-US" sz="1600" dirty="0"/>
+            </a:p>
+          </p:txBody>
+        </p:sp>
+        <p:sp>
+          <p:nvSpPr>
+            <p:cNvPr id="26" name="Rectangle 25"/>
+            <p:cNvSpPr/>
+            <p:nvPr/>
+          </p:nvSpPr>
+          <p:spPr>
+            <a:xfrm rot="16200000">
+              <a:off x="-268265" y="2907718"/>
+              <a:ext cx="1332096" cy="338554"/>
+            </a:xfrm>
+            <a:prstGeom prst="rect">
+              <a:avLst/>
+            </a:prstGeom>
+            <a:noFill/>
+          </p:spPr>
+          <p:txBody>
+            <a:bodyPr wrap="none">
+              <a:spAutoFit/>
+            </a:bodyPr>
+            <a:lstStyle/>
+            <a:p>
+              <a:r>
+                <a:rPr lang="en-US" sz="1600" dirty="0" smtClean="0"/>
+                <a:t>Runtime (sec)</a:t>
+              </a:r>
+              <a:endParaRPr lang="en-US" sz="1600" dirty="0"/>
+            </a:p>
+          </p:txBody>
+        </p:sp>
+        <p:sp>
+          <p:nvSpPr>
+            <p:cNvPr id="2" name="TextBox 1"/>
+            <p:cNvSpPr txBox="1"/>
+            <p:nvPr/>
+          </p:nvSpPr>
+          <p:spPr>
+            <a:xfrm>
+              <a:off x="2304527" y="1851795"/>
+              <a:ext cx="1066201" cy="400110"/>
+            </a:xfrm>
+            <a:prstGeom prst="rect">
+              <a:avLst/>
+            </a:prstGeom>
+            <a:solidFill>
+              <a:schemeClr val="bg1"/>
+            </a:solidFill>
+          </p:spPr>
+          <p:txBody>
+            <a:bodyPr wrap="square" rtlCol="0">
+              <a:spAutoFit/>
+            </a:bodyPr>
+            <a:lstStyle/>
+            <a:p>
+              <a:r>
+                <a:rPr lang="en-US" sz="2000" b="1" dirty="0" smtClean="0">
+                  <a:solidFill>
+                    <a:srgbClr val="474747"/>
+                  </a:solidFill>
+                </a:rPr>
+                <a:t>MIVCs</a:t>
+              </a:r>
+              <a:endParaRPr lang="en-US" sz="2000" b="1" dirty="0">
+                <a:solidFill>
+                  <a:srgbClr val="474747"/>
+                </a:solidFill>
+              </a:endParaRPr>
+            </a:p>
+          </p:txBody>
+        </p:sp>
+      </p:grpSp>
       <p:pic>
         <p:nvPicPr>
-          <p:cNvPr id="7" name="Picture 6"/>
-          <p:cNvPicPr>
-            <a:picLocks noChangeAspect="1"/>
-          </p:cNvPicPr>
-          <p:nvPr/>
-        </p:nvPicPr>
-        <p:blipFill rotWithShape="1">
-          <a:blip r:embed="rId2">
-            <a:extLst>
-              <a:ext uri="{28A0092B-C50C-407E-A947-70E740481C1C}">
-                <a14:useLocalDpi xmlns:a14="http://schemas.microsoft.com/office/drawing/2010/main" val="0"/>
-              </a:ext>
-            </a:extLst>
-          </a:blip>
-          <a:srcRect l="1597" b="3218"/>
-          <a:stretch/>
-        </p:blipFill>
-        <p:spPr>
-          <a:xfrm>
-            <a:off x="483559" y="109728"/>
-            <a:ext cx="10720505" cy="5898171"/>
-          </a:xfrm>
-          <a:prstGeom prst="rect">
-            <a:avLst/>
-          </a:prstGeom>
-        </p:spPr>
-      </p:pic>
-      <p:sp>
-        <p:nvSpPr>
-          <p:cNvPr id="5" name="Rectangle 4"/>
-          <p:cNvSpPr/>
-          <p:nvPr/>
-        </p:nvSpPr>
-        <p:spPr>
-          <a:xfrm>
-            <a:off x="5843811" y="5838622"/>
-            <a:ext cx="805029" cy="338554"/>
-          </a:xfrm>
-          <a:prstGeom prst="rect">
-            <a:avLst/>
-          </a:prstGeom>
-          <a:noFill/>
-        </p:spPr>
-        <p:txBody>
-          <a:bodyPr wrap="none">
-            <a:spAutoFit/>
-          </a:bodyPr>
-          <a:lstStyle/>
-          <a:p>
-            <a:r>
-              <a:rPr lang="en-US" sz="1600" dirty="0" smtClean="0"/>
-              <a:t>Models</a:t>
-            </a:r>
-            <a:endParaRPr lang="en-US" sz="1600" dirty="0"/>
-          </a:p>
-        </p:txBody>
-      </p:sp>
-      <p:sp>
-        <p:nvSpPr>
-          <p:cNvPr id="6" name="Rectangle 5"/>
-          <p:cNvSpPr/>
-          <p:nvPr/>
-        </p:nvSpPr>
-        <p:spPr>
-          <a:xfrm rot="16200000">
-            <a:off x="118669" y="1826593"/>
-            <a:ext cx="813043" cy="338554"/>
-          </a:xfrm>
-          <a:prstGeom prst="rect">
-            <a:avLst/>
-          </a:prstGeom>
-          <a:noFill/>
-        </p:spPr>
-        <p:txBody>
-          <a:bodyPr wrap="none">
-            <a:spAutoFit/>
-          </a:bodyPr>
-          <a:lstStyle/>
-          <a:p>
-            <a:r>
-              <a:rPr lang="en-US" sz="1600" dirty="0" smtClean="0"/>
-              <a:t>IVC size</a:t>
-            </a:r>
-            <a:endParaRPr lang="en-US" sz="1600" dirty="0"/>
-          </a:p>
-        </p:txBody>
-      </p:sp>
-      <p:pic>
-        <p:nvPicPr>
-          <p:cNvPr id="2" name="Picture 1"/>
+          <p:cNvPr id="6" name="Picture 5"/>
           <p:cNvPicPr>
             <a:picLocks noChangeAspect="1"/>
           </p:cNvPicPr>
           <p:nvPr/>
         </p:nvPicPr>
         <p:blipFill>
-          <a:blip r:embed="rId3"/>
+          <a:blip r:embed="rId4"/>
           <a:stretch>
             <a:fillRect/>
           </a:stretch>
         </p:blipFill>
         <p:spPr>
           <a:xfrm>
-            <a:off x="905375" y="213690"/>
-            <a:ext cx="7808217" cy="1576118"/>
+            <a:off x="1052166" y="350221"/>
+            <a:ext cx="6991350" cy="2390775"/>
           </a:xfrm>
           <a:prstGeom prst="rect">
             <a:avLst/>
@@ -3163,7 +3276,7 @@
     </p:spTree>
     <p:extLst>
       <p:ext uri="{BB962C8B-B14F-4D97-AF65-F5344CB8AC3E}">
-        <p14:creationId xmlns:p14="http://schemas.microsoft.com/office/powerpoint/2010/main" val="2477388029"/>
+        <p14:creationId xmlns:p14="http://schemas.microsoft.com/office/powerpoint/2010/main" val="219871825"/>
       </p:ext>
     </p:extLst>
   </p:cSld>
@@ -3190,15 +3303,75 @@
           <a:chExt cx="0" cy="0"/>
         </a:xfrm>
       </p:grpSpPr>
+      <p:sp>
+        <p:nvSpPr>
+          <p:cNvPr id="5" name="Rectangle 4"/>
+          <p:cNvSpPr/>
+          <p:nvPr/>
+        </p:nvSpPr>
+        <p:spPr>
+          <a:xfrm>
+            <a:off x="5843811" y="5838622"/>
+            <a:ext cx="805029" cy="338554"/>
+          </a:xfrm>
+          <a:prstGeom prst="rect">
+            <a:avLst/>
+          </a:prstGeom>
+          <a:noFill/>
+        </p:spPr>
+        <p:txBody>
+          <a:bodyPr wrap="none">
+            <a:spAutoFit/>
+          </a:bodyPr>
+          <a:lstStyle/>
+          <a:p>
+            <a:r>
+              <a:rPr lang="en-US" sz="1600" dirty="0" smtClean="0"/>
+              <a:t>Models</a:t>
+            </a:r>
+            <a:endParaRPr lang="en-US" sz="1600" dirty="0"/>
+          </a:p>
+        </p:txBody>
+      </p:sp>
+      <p:sp>
+        <p:nvSpPr>
+          <p:cNvPr id="6" name="Rectangle 5"/>
+          <p:cNvSpPr/>
+          <p:nvPr/>
+        </p:nvSpPr>
+        <p:spPr>
+          <a:xfrm rot="16200000">
+            <a:off x="-113606" y="2842593"/>
+            <a:ext cx="1277594" cy="338554"/>
+          </a:xfrm>
+          <a:prstGeom prst="rect">
+            <a:avLst/>
+          </a:prstGeom>
+          <a:noFill/>
+        </p:spPr>
+        <p:txBody>
+          <a:bodyPr wrap="none">
+            <a:spAutoFit/>
+          </a:bodyPr>
+          <a:lstStyle/>
+          <a:p>
+            <a:r>
+              <a:rPr lang="en-US" sz="1600" dirty="0" smtClean="0"/>
+              <a:t>#of elements</a:t>
+            </a:r>
+            <a:endParaRPr lang="en-US" sz="1600" dirty="0"/>
+          </a:p>
+        </p:txBody>
+      </p:sp>
       <p:pic>
         <p:nvPicPr>
-          <p:cNvPr id="6" name="Picture 5"/>
+          <p:cNvPr id="3" name="Picture 2"/>
           <p:cNvPicPr>
             <a:picLocks noChangeAspect="1"/>
           </p:cNvPicPr>
           <p:nvPr/>
         </p:nvPicPr>
-        <p:blipFill>
+        <p:blipFill rotWithShape="1">
           <a:blip r:embed="rId2">
             <a:extLst>
               <a:ext uri="{28A0092B-C50C-407E-A947-70E740481C1C}">
@@ -3206,14 +3379,243 @@
               </a:ext>
             </a:extLst>
           </a:blip>
+          <a:srcRect l="1324" b="3135"/>
+          <a:stretch/>
+        </p:blipFill>
+        <p:spPr>
+          <a:xfrm>
+            <a:off x="694468" y="-202018"/>
+            <a:ext cx="11065141" cy="6074432"/>
+          </a:xfrm>
+          <a:prstGeom prst="rect">
+            <a:avLst/>
+          </a:prstGeom>
+        </p:spPr>
+      </p:pic>
+      <p:pic>
+        <p:nvPicPr>
+          <p:cNvPr id="4" name="Picture 3"/>
+          <p:cNvPicPr>
+            <a:picLocks noChangeAspect="1"/>
+          </p:cNvPicPr>
+          <p:nvPr/>
+        </p:nvPicPr>
+        <p:blipFill>
+          <a:blip r:embed="rId3"/>
           <a:stretch>
             <a:fillRect/>
           </a:stretch>
         </p:blipFill>
         <p:spPr>
           <a:xfrm>
-            <a:off x="525429" y="202123"/>
-            <a:ext cx="10898910" cy="6296336"/>
+            <a:off x="1041992" y="-106325"/>
+            <a:ext cx="7527851" cy="1533800"/>
+          </a:xfrm>
+          <a:prstGeom prst="rect">
+            <a:avLst/>
+          </a:prstGeom>
+        </p:spPr>
+      </p:pic>
+    </p:spTree>
+    <p:extLst>
+      <p:ext uri="{BB962C8B-B14F-4D97-AF65-F5344CB8AC3E}">
+        <p14:creationId xmlns:p14="http://schemas.microsoft.com/office/powerpoint/2010/main" val="2477388029"/>
+      </p:ext>
+    </p:extLst>
+  </p:cSld>
+  <p:clrMapOvr>
+    <a:masterClrMapping/>
+  </p:clrMapOvr>
+</p:sld>
+</file>
+
+<file path=ppt/slides/slide12.xml><?xml version="1.0" encoding="utf-8"?>
+<p:sld xmlns:a="http://schemas.openxmlformats.org/drawingml/2006/main" xmlns:r="http://schemas.openxmlformats.org/officeDocument/2006/relationships" xmlns:p="http://schemas.openxmlformats.org/presentationml/2006/main">
+  <p:cSld>
+    <p:spTree>
+      <p:nvGrpSpPr>
+        <p:cNvPr id="1" name=""/>
+        <p:cNvGrpSpPr/>
+        <p:nvPr/>
+      </p:nvGrpSpPr>
+      <p:grpSpPr>
+        <a:xfrm>
+          <a:off x="0" y="0"/>
+          <a:ext cx="0" cy="0"/>
+          <a:chOff x="0" y="0"/>
+          <a:chExt cx="0" cy="0"/>
+        </a:xfrm>
+      </p:grpSpPr>
+      <p:sp>
+        <p:nvSpPr>
+          <p:cNvPr id="5" name="Rectangle 4"/>
+          <p:cNvSpPr/>
+          <p:nvPr/>
+        </p:nvSpPr>
+        <p:spPr>
+          <a:xfrm>
+            <a:off x="5960352" y="5740010"/>
+            <a:ext cx="805029" cy="338554"/>
+          </a:xfrm>
+          <a:prstGeom prst="rect">
+            <a:avLst/>
+          </a:prstGeom>
+          <a:noFill/>
+        </p:spPr>
+        <p:txBody>
+          <a:bodyPr wrap="none">
+            <a:spAutoFit/>
+          </a:bodyPr>
+          <a:lstStyle/>
+          <a:p>
+            <a:r>
+              <a:rPr lang="en-US" sz="1600" dirty="0" smtClean="0"/>
+              <a:t>Models</a:t>
+            </a:r>
+            <a:endParaRPr lang="en-US" sz="1600" dirty="0"/>
+          </a:p>
+        </p:txBody>
+      </p:sp>
+      <p:sp>
+        <p:nvSpPr>
+          <p:cNvPr id="6" name="Rectangle 5"/>
+          <p:cNvSpPr/>
+          <p:nvPr/>
+        </p:nvSpPr>
+        <p:spPr>
+          <a:xfrm rot="16200000">
+            <a:off x="-757561" y="2636406"/>
+            <a:ext cx="2565511" cy="338554"/>
+          </a:xfrm>
+          <a:prstGeom prst="rect">
+            <a:avLst/>
+          </a:prstGeom>
+          <a:noFill/>
+        </p:spPr>
+        <p:txBody>
+          <a:bodyPr wrap="none">
+            <a:spAutoFit/>
+          </a:bodyPr>
+          <a:lstStyle/>
+          <a:p>
+            <a:r>
+              <a:rPr lang="en-US" sz="1600" dirty="0" smtClean="0"/>
+              <a:t>#of </a:t>
+            </a:r>
+            <a:r>
+              <a:rPr lang="en-US" sz="1600" dirty="0" smtClean="0"/>
+              <a:t>covered model elements</a:t>
+            </a:r>
+            <a:endParaRPr lang="en-US" sz="1600" dirty="0"/>
+          </a:p>
+        </p:txBody>
+      </p:sp>
+      <p:pic>
+        <p:nvPicPr>
+          <p:cNvPr id="2" name="Picture 1"/>
+          <p:cNvPicPr>
+            <a:picLocks noChangeAspect="1"/>
+          </p:cNvPicPr>
+          <p:nvPr/>
+        </p:nvPicPr>
+        <p:blipFill rotWithShape="1">
+          <a:blip r:embed="rId2">
+            <a:extLst>
+              <a:ext uri="{28A0092B-C50C-407E-A947-70E740481C1C}">
+                <a14:useLocalDpi xmlns:a14="http://schemas.microsoft.com/office/drawing/2010/main" val="0"/>
+              </a:ext>
+            </a:extLst>
+          </a:blip>
+          <a:srcRect l="1531" t="3050" b="2904"/>
+          <a:stretch/>
+        </p:blipFill>
+        <p:spPr>
+          <a:xfrm>
+            <a:off x="694471" y="137069"/>
+            <a:ext cx="10687806" cy="5701553"/>
+          </a:xfrm>
+          <a:prstGeom prst="rect">
+            <a:avLst/>
+          </a:prstGeom>
+        </p:spPr>
+      </p:pic>
+      <p:pic>
+        <p:nvPicPr>
+          <p:cNvPr id="7" name="Picture 6"/>
+          <p:cNvPicPr>
+            <a:picLocks noChangeAspect="1"/>
+          </p:cNvPicPr>
+          <p:nvPr/>
+        </p:nvPicPr>
+        <p:blipFill>
+          <a:blip r:embed="rId3"/>
+          <a:stretch>
+            <a:fillRect/>
+          </a:stretch>
+        </p:blipFill>
+        <p:spPr>
+          <a:xfrm>
+            <a:off x="1112837" y="222250"/>
+            <a:ext cx="4619625" cy="1828800"/>
+          </a:xfrm>
+          <a:prstGeom prst="rect">
+            <a:avLst/>
+          </a:prstGeom>
+        </p:spPr>
+      </p:pic>
+    </p:spTree>
+    <p:extLst>
+      <p:ext uri="{BB962C8B-B14F-4D97-AF65-F5344CB8AC3E}">
+        <p14:creationId xmlns:p14="http://schemas.microsoft.com/office/powerpoint/2010/main" val="743473649"/>
+      </p:ext>
+    </p:extLst>
+  </p:cSld>
+  <p:clrMapOvr>
+    <a:masterClrMapping/>
+  </p:clrMapOvr>
+</p:sld>
+</file>
+
+<file path=ppt/slides/slide13.xml><?xml version="1.0" encoding="utf-8"?>
+<p:sld xmlns:a="http://schemas.openxmlformats.org/drawingml/2006/main" xmlns:r="http://schemas.openxmlformats.org/officeDocument/2006/relationships" xmlns:p="http://schemas.openxmlformats.org/presentationml/2006/main">
+  <p:cSld>
+    <p:spTree>
+      <p:nvGrpSpPr>
+        <p:cNvPr id="1" name=""/>
+        <p:cNvGrpSpPr/>
+        <p:nvPr/>
+      </p:nvGrpSpPr>
+      <p:grpSpPr>
+        <a:xfrm>
+          <a:off x="0" y="0"/>
+          <a:ext cx="0" cy="0"/>
+          <a:chOff x="0" y="0"/>
+          <a:chExt cx="0" cy="0"/>
+        </a:xfrm>
+      </p:grpSpPr>
+      <p:pic>
+        <p:nvPicPr>
+          <p:cNvPr id="3" name="Picture 2"/>
+          <p:cNvPicPr>
+            <a:picLocks noChangeAspect="1"/>
+          </p:cNvPicPr>
+          <p:nvPr/>
+        </p:nvPicPr>
+        <p:blipFill rotWithShape="1">
+          <a:blip r:embed="rId2">
+            <a:extLst>
+              <a:ext uri="{28A0092B-C50C-407E-A947-70E740481C1C}">
+                <a14:useLocalDpi xmlns:a14="http://schemas.microsoft.com/office/drawing/2010/main" val="0"/>
+              </a:ext>
+            </a:extLst>
+          </a:blip>
+          <a:srcRect l="1813" b="3730"/>
+          <a:stretch/>
+        </p:blipFill>
+        <p:spPr>
+          <a:xfrm>
+            <a:off x="525429" y="109329"/>
+            <a:ext cx="11666571" cy="6219854"/>
           </a:xfrm>
           <a:prstGeom prst="rect">
             <a:avLst/>
@@ -3296,7 +3698,7 @@
         </p:blipFill>
         <p:spPr>
           <a:xfrm>
-            <a:off x="1048038" y="331915"/>
+            <a:off x="1048038" y="215801"/>
             <a:ext cx="6337324" cy="2220851"/>
           </a:xfrm>
           <a:prstGeom prst="rect">
@@ -3308,6 +3710,156 @@
     <p:extLst>
       <p:ext uri="{BB962C8B-B14F-4D97-AF65-F5344CB8AC3E}">
         <p14:creationId xmlns:p14="http://schemas.microsoft.com/office/powerpoint/2010/main" val="3493321500"/>
+      </p:ext>
+    </p:extLst>
+  </p:cSld>
+  <p:clrMapOvr>
+    <a:masterClrMapping/>
+  </p:clrMapOvr>
+  <p:timing>
+    <p:tnLst>
+      <p:par>
+        <p:cTn id="1" dur="indefinite" restart="never" nodeType="tmRoot"/>
+      </p:par>
+    </p:tnLst>
+  </p:timing>
+</p:sld>
+</file>
+
+<file path=ppt/slides/slide14.xml><?xml version="1.0" encoding="utf-8"?>
+<p:sld xmlns:a="http://schemas.openxmlformats.org/drawingml/2006/main" xmlns:r="http://schemas.openxmlformats.org/officeDocument/2006/relationships" xmlns:p="http://schemas.openxmlformats.org/presentationml/2006/main">
+  <p:cSld>
+    <p:spTree>
+      <p:nvGrpSpPr>
+        <p:cNvPr id="1" name=""/>
+        <p:cNvGrpSpPr/>
+        <p:nvPr/>
+      </p:nvGrpSpPr>
+      <p:grpSpPr>
+        <a:xfrm>
+          <a:off x="0" y="0"/>
+          <a:ext cx="0" cy="0"/>
+          <a:chOff x="0" y="0"/>
+          <a:chExt cx="0" cy="0"/>
+        </a:xfrm>
+      </p:grpSpPr>
+      <p:pic>
+        <p:nvPicPr>
+          <p:cNvPr id="6" name="Picture 5"/>
+          <p:cNvPicPr>
+            <a:picLocks noChangeAspect="1"/>
+          </p:cNvPicPr>
+          <p:nvPr/>
+        </p:nvPicPr>
+        <p:blipFill rotWithShape="1">
+          <a:blip r:embed="rId2">
+            <a:extLst>
+              <a:ext uri="{28A0092B-C50C-407E-A947-70E740481C1C}">
+                <a14:useLocalDpi xmlns:a14="http://schemas.microsoft.com/office/drawing/2010/main" val="0"/>
+              </a:ext>
+            </a:extLst>
+          </a:blip>
+          <a:srcRect t="7339"/>
+          <a:stretch/>
+        </p:blipFill>
+        <p:spPr>
+          <a:xfrm>
+            <a:off x="426978" y="609600"/>
+            <a:ext cx="10853950" cy="5617560"/>
+          </a:xfrm>
+          <a:prstGeom prst="rect">
+            <a:avLst/>
+          </a:prstGeom>
+        </p:spPr>
+      </p:pic>
+      <p:sp>
+        <p:nvSpPr>
+          <p:cNvPr id="5" name="Rectangle 4"/>
+          <p:cNvSpPr/>
+          <p:nvPr/>
+        </p:nvSpPr>
+        <p:spPr>
+          <a:xfrm rot="16200000">
+            <a:off x="-309896" y="3049537"/>
+            <a:ext cx="1332096" cy="338554"/>
+          </a:xfrm>
+          <a:prstGeom prst="rect">
+            <a:avLst/>
+          </a:prstGeom>
+          <a:noFill/>
+        </p:spPr>
+        <p:txBody>
+          <a:bodyPr wrap="none">
+            <a:spAutoFit/>
+          </a:bodyPr>
+          <a:lstStyle/>
+          <a:p>
+            <a:r>
+              <a:rPr lang="en-US" sz="1600" dirty="0" smtClean="0"/>
+              <a:t>Runtime (sec)</a:t>
+            </a:r>
+            <a:endParaRPr lang="en-US" sz="1600" dirty="0"/>
+          </a:p>
+        </p:txBody>
+      </p:sp>
+      <p:sp>
+        <p:nvSpPr>
+          <p:cNvPr id="4" name="Rectangle 3"/>
+          <p:cNvSpPr/>
+          <p:nvPr/>
+        </p:nvSpPr>
+        <p:spPr>
+          <a:xfrm>
+            <a:off x="5780371" y="6155442"/>
+            <a:ext cx="805029" cy="338554"/>
+          </a:xfrm>
+          <a:prstGeom prst="rect">
+            <a:avLst/>
+          </a:prstGeom>
+          <a:noFill/>
+        </p:spPr>
+        <p:txBody>
+          <a:bodyPr wrap="none">
+            <a:spAutoFit/>
+          </a:bodyPr>
+          <a:lstStyle/>
+          <a:p>
+            <a:r>
+              <a:rPr lang="en-US" sz="1600" dirty="0" smtClean="0"/>
+              <a:t>Models</a:t>
+            </a:r>
+            <a:endParaRPr lang="en-US" sz="1600" dirty="0"/>
+          </a:p>
+        </p:txBody>
+      </p:sp>
+      <p:pic>
+        <p:nvPicPr>
+          <p:cNvPr id="7" name="Picture 6"/>
+          <p:cNvPicPr>
+            <a:picLocks noChangeAspect="1"/>
+          </p:cNvPicPr>
+          <p:nvPr/>
+        </p:nvPicPr>
+        <p:blipFill>
+          <a:blip r:embed="rId3"/>
+          <a:stretch>
+            <a:fillRect/>
+          </a:stretch>
+        </p:blipFill>
+        <p:spPr>
+          <a:xfrm>
+            <a:off x="924306" y="707389"/>
+            <a:ext cx="6848475" cy="2409825"/>
+          </a:xfrm>
+          <a:prstGeom prst="rect">
+            <a:avLst/>
+          </a:prstGeom>
+        </p:spPr>
+      </p:pic>
+    </p:spTree>
+    <p:extLst>
+      <p:ext uri="{BB962C8B-B14F-4D97-AF65-F5344CB8AC3E}">
+        <p14:creationId xmlns:p14="http://schemas.microsoft.com/office/powerpoint/2010/main" val="863132859"/>
       </p:ext>
     </p:extLst>
   </p:cSld>
@@ -6478,6 +7030,1959 @@
 </file>
 
 <file path=ppt/slides/slide5.xml><?xml version="1.0" encoding="utf-8"?>
+<p:sld xmlns:a="http://schemas.openxmlformats.org/drawingml/2006/main" xmlns:r="http://schemas.openxmlformats.org/officeDocument/2006/relationships" xmlns:p="http://schemas.openxmlformats.org/presentationml/2006/main">
+  <p:cSld>
+    <p:spTree>
+      <p:nvGrpSpPr>
+        <p:cNvPr id="1" name=""/>
+        <p:cNvGrpSpPr/>
+        <p:nvPr/>
+      </p:nvGrpSpPr>
+      <p:grpSpPr>
+        <a:xfrm>
+          <a:off x="0" y="0"/>
+          <a:ext cx="0" cy="0"/>
+          <a:chOff x="0" y="0"/>
+          <a:chExt cx="0" cy="0"/>
+        </a:xfrm>
+      </p:grpSpPr>
+      <p:sp>
+        <p:nvSpPr>
+          <p:cNvPr id="4" name="Content Placeholder 2"/>
+          <p:cNvSpPr>
+            <a:spLocks noGrp="1"/>
+          </p:cNvSpPr>
+          <p:nvPr/>
+        </p:nvSpPr>
+        <p:spPr>
+          <a:xfrm>
+            <a:off x="1246588" y="257345"/>
+            <a:ext cx="6460212" cy="6199804"/>
+          </a:xfrm>
+          <a:prstGeom prst="rect">
+            <a:avLst/>
+          </a:prstGeom>
+        </p:spPr>
+        <p:txBody>
+          <a:bodyPr vert="horz" lIns="91440" tIns="45720" rIns="91440" bIns="45720" rtlCol="0">
+            <a:noAutofit/>
+          </a:bodyPr>
+          <a:lstStyle>
+            <a:lvl1pPr marL="228600" indent="-228600" algn="l" defTabSz="914400" rtl="0" eaLnBrk="1" latinLnBrk="0" hangingPunct="1">
+              <a:lnSpc>
+                <a:spcPct val="90000"/>
+              </a:lnSpc>
+              <a:spcBef>
+                <a:spcPts val="1000"/>
+              </a:spcBef>
+              <a:buFont typeface="Arial" panose="020B0604020202020204" pitchFamily="34" charset="0"/>
+              <a:buChar char="•"/>
+              <a:defRPr sz="2800" kern="1200">
+                <a:solidFill>
+                  <a:schemeClr val="tx1"/>
+                </a:solidFill>
+                <a:latin typeface="+mn-lt"/>
+                <a:ea typeface="+mn-ea"/>
+                <a:cs typeface="+mn-cs"/>
+              </a:defRPr>
+            </a:lvl1pPr>
+            <a:lvl2pPr marL="685800" indent="-228600" algn="l" defTabSz="914400" rtl="0" eaLnBrk="1" latinLnBrk="0" hangingPunct="1">
+              <a:lnSpc>
+                <a:spcPct val="90000"/>
+              </a:lnSpc>
+              <a:spcBef>
+                <a:spcPts val="500"/>
+              </a:spcBef>
+              <a:buFont typeface="Arial" panose="020B0604020202020204" pitchFamily="34" charset="0"/>
+              <a:buChar char="•"/>
+              <a:defRPr sz="2400" kern="1200">
+                <a:solidFill>
+                  <a:schemeClr val="tx1"/>
+                </a:solidFill>
+                <a:latin typeface="+mn-lt"/>
+                <a:ea typeface="+mn-ea"/>
+                <a:cs typeface="+mn-cs"/>
+              </a:defRPr>
+            </a:lvl2pPr>
+            <a:lvl3pPr marL="1143000" indent="-228600" algn="l" defTabSz="914400" rtl="0" eaLnBrk="1" latinLnBrk="0" hangingPunct="1">
+              <a:lnSpc>
+                <a:spcPct val="90000"/>
+              </a:lnSpc>
+              <a:spcBef>
+                <a:spcPts val="500"/>
+              </a:spcBef>
+              <a:buFont typeface="Arial" panose="020B0604020202020204" pitchFamily="34" charset="0"/>
+              <a:buChar char="•"/>
+              <a:defRPr sz="2000" kern="1200">
+                <a:solidFill>
+                  <a:schemeClr val="tx1"/>
+                </a:solidFill>
+                <a:latin typeface="+mn-lt"/>
+                <a:ea typeface="+mn-ea"/>
+                <a:cs typeface="+mn-cs"/>
+              </a:defRPr>
+            </a:lvl3pPr>
+            <a:lvl4pPr marL="1600200" indent="-228600" algn="l" defTabSz="914400" rtl="0" eaLnBrk="1" latinLnBrk="0" hangingPunct="1">
+              <a:lnSpc>
+                <a:spcPct val="90000"/>
+              </a:lnSpc>
+              <a:spcBef>
+                <a:spcPts val="500"/>
+              </a:spcBef>
+              <a:buFont typeface="Arial" panose="020B0604020202020204" pitchFamily="34" charset="0"/>
+              <a:buChar char="•"/>
+              <a:defRPr sz="1800" kern="1200">
+                <a:solidFill>
+                  <a:schemeClr val="tx1"/>
+                </a:solidFill>
+                <a:latin typeface="+mn-lt"/>
+                <a:ea typeface="+mn-ea"/>
+                <a:cs typeface="+mn-cs"/>
+              </a:defRPr>
+            </a:lvl4pPr>
+            <a:lvl5pPr marL="2057400" indent="-228600" algn="l" defTabSz="914400" rtl="0" eaLnBrk="1" latinLnBrk="0" hangingPunct="1">
+              <a:lnSpc>
+                <a:spcPct val="90000"/>
+              </a:lnSpc>
+              <a:spcBef>
+                <a:spcPts val="500"/>
+              </a:spcBef>
+              <a:buFont typeface="Arial" panose="020B0604020202020204" pitchFamily="34" charset="0"/>
+              <a:buChar char="•"/>
+              <a:defRPr sz="1800" kern="1200">
+                <a:solidFill>
+                  <a:schemeClr val="tx1"/>
+                </a:solidFill>
+                <a:latin typeface="+mn-lt"/>
+                <a:ea typeface="+mn-ea"/>
+                <a:cs typeface="+mn-cs"/>
+              </a:defRPr>
+            </a:lvl5pPr>
+            <a:lvl6pPr marL="2514600" indent="-228600" algn="l" defTabSz="914400" rtl="0" eaLnBrk="1" latinLnBrk="0" hangingPunct="1">
+              <a:lnSpc>
+                <a:spcPct val="90000"/>
+              </a:lnSpc>
+              <a:spcBef>
+                <a:spcPts val="500"/>
+              </a:spcBef>
+              <a:buFont typeface="Arial" panose="020B0604020202020204" pitchFamily="34" charset="0"/>
+              <a:buChar char="•"/>
+              <a:defRPr sz="1800" kern="1200">
+                <a:solidFill>
+                  <a:schemeClr val="tx1"/>
+                </a:solidFill>
+                <a:latin typeface="+mn-lt"/>
+                <a:ea typeface="+mn-ea"/>
+                <a:cs typeface="+mn-cs"/>
+              </a:defRPr>
+            </a:lvl6pPr>
+            <a:lvl7pPr marL="2971800" indent="-228600" algn="l" defTabSz="914400" rtl="0" eaLnBrk="1" latinLnBrk="0" hangingPunct="1">
+              <a:lnSpc>
+                <a:spcPct val="90000"/>
+              </a:lnSpc>
+              <a:spcBef>
+                <a:spcPts val="500"/>
+              </a:spcBef>
+              <a:buFont typeface="Arial" panose="020B0604020202020204" pitchFamily="34" charset="0"/>
+              <a:buChar char="•"/>
+              <a:defRPr sz="1800" kern="1200">
+                <a:solidFill>
+                  <a:schemeClr val="tx1"/>
+                </a:solidFill>
+                <a:latin typeface="+mn-lt"/>
+                <a:ea typeface="+mn-ea"/>
+                <a:cs typeface="+mn-cs"/>
+              </a:defRPr>
+            </a:lvl7pPr>
+            <a:lvl8pPr marL="3429000" indent="-228600" algn="l" defTabSz="914400" rtl="0" eaLnBrk="1" latinLnBrk="0" hangingPunct="1">
+              <a:lnSpc>
+                <a:spcPct val="90000"/>
+              </a:lnSpc>
+              <a:spcBef>
+                <a:spcPts val="500"/>
+              </a:spcBef>
+              <a:buFont typeface="Arial" panose="020B0604020202020204" pitchFamily="34" charset="0"/>
+              <a:buChar char="•"/>
+              <a:defRPr sz="1800" kern="1200">
+                <a:solidFill>
+                  <a:schemeClr val="tx1"/>
+                </a:solidFill>
+                <a:latin typeface="+mn-lt"/>
+                <a:ea typeface="+mn-ea"/>
+                <a:cs typeface="+mn-cs"/>
+              </a:defRPr>
+            </a:lvl8pPr>
+            <a:lvl9pPr marL="3886200" indent="-228600" algn="l" defTabSz="914400" rtl="0" eaLnBrk="1" latinLnBrk="0" hangingPunct="1">
+              <a:lnSpc>
+                <a:spcPct val="90000"/>
+              </a:lnSpc>
+              <a:spcBef>
+                <a:spcPts val="500"/>
+              </a:spcBef>
+              <a:buFont typeface="Arial" panose="020B0604020202020204" pitchFamily="34" charset="0"/>
+              <a:buChar char="•"/>
+              <a:defRPr sz="1800" kern="1200">
+                <a:solidFill>
+                  <a:schemeClr val="tx1"/>
+                </a:solidFill>
+                <a:latin typeface="+mn-lt"/>
+                <a:ea typeface="+mn-ea"/>
+                <a:cs typeface="+mn-cs"/>
+              </a:defRPr>
+            </a:lvl9pPr>
+          </a:lstStyle>
+          <a:p>
+            <a:pPr marL="0" indent="0">
+              <a:lnSpc>
+                <a:spcPct val="120000"/>
+              </a:lnSpc>
+              <a:spcBef>
+                <a:spcPts val="400"/>
+              </a:spcBef>
+              <a:buNone/>
+            </a:pPr>
+            <a:r>
+              <a:rPr lang="en-US" sz="1800" b="1" dirty="0" smtClean="0">
+                <a:latin typeface="Consolas" panose="020B0609020204030204" pitchFamily="49" charset="0"/>
+                <a:cs typeface="Courier New" panose="02070309020205020404" pitchFamily="49" charset="0"/>
+              </a:rPr>
+              <a:t>  </a:t>
+            </a:r>
+            <a:r>
+              <a:rPr lang="en-US" sz="1800" b="1" dirty="0" smtClean="0">
+                <a:solidFill>
+                  <a:srgbClr val="920049"/>
+                </a:solidFill>
+                <a:latin typeface="Consolas" panose="020B0609020204030204" pitchFamily="49" charset="0"/>
+                <a:cs typeface="Courier New" panose="02070309020205020404" pitchFamily="49" charset="0"/>
+              </a:rPr>
+              <a:t>node</a:t>
+            </a:r>
+            <a:r>
+              <a:rPr lang="en-US" sz="1800" dirty="0" smtClean="0">
+                <a:latin typeface="Consolas" panose="020B0609020204030204" pitchFamily="49" charset="0"/>
+                <a:cs typeface="Courier New" panose="02070309020205020404" pitchFamily="49" charset="0"/>
+              </a:rPr>
+              <a:t> </a:t>
+            </a:r>
+            <a:r>
+              <a:rPr lang="en-US" sz="1800" dirty="0" err="1" smtClean="0">
+                <a:latin typeface="Consolas" panose="020B0609020204030204" pitchFamily="49" charset="0"/>
+                <a:cs typeface="Courier New" panose="02070309020205020404" pitchFamily="49" charset="0"/>
+              </a:rPr>
+              <a:t>asw</a:t>
+            </a:r>
+            <a:r>
+              <a:rPr lang="en-US" sz="1800" dirty="0" smtClean="0">
+                <a:latin typeface="Consolas" panose="020B0609020204030204" pitchFamily="49" charset="0"/>
+                <a:cs typeface="Courier New" panose="02070309020205020404" pitchFamily="49" charset="0"/>
+              </a:rPr>
+              <a:t> </a:t>
+            </a:r>
+            <a:r>
+              <a:rPr lang="en-US" sz="1800" b="1" dirty="0" smtClean="0">
+                <a:solidFill>
+                  <a:srgbClr val="920049"/>
+                </a:solidFill>
+                <a:latin typeface="Consolas" panose="020B0609020204030204" pitchFamily="49" charset="0"/>
+                <a:cs typeface="Courier New" panose="02070309020205020404" pitchFamily="49" charset="0"/>
+              </a:rPr>
+              <a:t>(</a:t>
+            </a:r>
+            <a:r>
+              <a:rPr lang="en-US" sz="1800" dirty="0">
+                <a:latin typeface="Consolas" panose="020B0609020204030204" pitchFamily="49" charset="0"/>
+                <a:cs typeface="Courier New" panose="02070309020205020404" pitchFamily="49" charset="0"/>
+              </a:rPr>
+              <a:t>alt1</a:t>
+            </a:r>
+            <a:r>
+              <a:rPr lang="en-US" sz="1800" b="1" dirty="0">
+                <a:solidFill>
+                  <a:srgbClr val="920049"/>
+                </a:solidFill>
+                <a:latin typeface="Consolas" panose="020B0609020204030204" pitchFamily="49" charset="0"/>
+                <a:cs typeface="Courier New" panose="02070309020205020404" pitchFamily="49" charset="0"/>
+              </a:rPr>
+              <a:t>,</a:t>
+            </a:r>
+            <a:r>
+              <a:rPr lang="en-US" sz="1800" dirty="0">
+                <a:latin typeface="Consolas" panose="020B0609020204030204" pitchFamily="49" charset="0"/>
+                <a:cs typeface="Courier New" panose="02070309020205020404" pitchFamily="49" charset="0"/>
+              </a:rPr>
+              <a:t> alt2</a:t>
+            </a:r>
+            <a:r>
+              <a:rPr lang="en-US" sz="1800" b="1" dirty="0">
+                <a:solidFill>
+                  <a:srgbClr val="920049"/>
+                </a:solidFill>
+                <a:latin typeface="Consolas" panose="020B0609020204030204" pitchFamily="49" charset="0"/>
+                <a:cs typeface="Courier New" panose="02070309020205020404" pitchFamily="49" charset="0"/>
+              </a:rPr>
+              <a:t>:</a:t>
+            </a:r>
+            <a:r>
+              <a:rPr lang="en-US" sz="1800" dirty="0">
+                <a:solidFill>
+                  <a:srgbClr val="920049"/>
+                </a:solidFill>
+                <a:latin typeface="Consolas" panose="020B0609020204030204" pitchFamily="49" charset="0"/>
+                <a:cs typeface="Courier New" panose="02070309020205020404" pitchFamily="49" charset="0"/>
+              </a:rPr>
+              <a:t> </a:t>
+            </a:r>
+            <a:r>
+              <a:rPr lang="en-US" sz="1800" b="1" dirty="0" err="1">
+                <a:solidFill>
+                  <a:srgbClr val="920049"/>
+                </a:solidFill>
+                <a:latin typeface="Consolas" panose="020B0609020204030204" pitchFamily="49" charset="0"/>
+                <a:cs typeface="Courier New" panose="02070309020205020404" pitchFamily="49" charset="0"/>
+              </a:rPr>
+              <a:t>int</a:t>
+            </a:r>
+            <a:r>
+              <a:rPr lang="en-US" sz="1800" b="1" dirty="0">
+                <a:solidFill>
+                  <a:srgbClr val="920049"/>
+                </a:solidFill>
+                <a:latin typeface="Consolas" panose="020B0609020204030204" pitchFamily="49" charset="0"/>
+                <a:cs typeface="Courier New" panose="02070309020205020404" pitchFamily="49" charset="0"/>
+              </a:rPr>
+              <a:t>; </a:t>
+            </a:r>
+            <a:r>
+              <a:rPr lang="en-US" sz="1800" dirty="0">
+                <a:latin typeface="Consolas" panose="020B0609020204030204" pitchFamily="49" charset="0"/>
+                <a:cs typeface="Courier New" panose="02070309020205020404" pitchFamily="49" charset="0"/>
+              </a:rPr>
+              <a:t>inhibit</a:t>
+            </a:r>
+            <a:r>
+              <a:rPr lang="en-US" sz="1800" b="1" dirty="0">
+                <a:solidFill>
+                  <a:srgbClr val="920049"/>
+                </a:solidFill>
+                <a:latin typeface="Consolas" panose="020B0609020204030204" pitchFamily="49" charset="0"/>
+                <a:cs typeface="Courier New" panose="02070309020205020404" pitchFamily="49" charset="0"/>
+              </a:rPr>
+              <a:t>: </a:t>
+            </a:r>
+            <a:r>
+              <a:rPr lang="en-US" sz="1800" b="1" dirty="0" smtClean="0">
+                <a:solidFill>
+                  <a:srgbClr val="920049"/>
+                </a:solidFill>
+                <a:latin typeface="Consolas" panose="020B0609020204030204" pitchFamily="49" charset="0"/>
+                <a:cs typeface="Courier New" panose="02070309020205020404" pitchFamily="49" charset="0"/>
+              </a:rPr>
+              <a:t>bool)</a:t>
+            </a:r>
+          </a:p>
+          <a:p>
+            <a:pPr marL="0" indent="0">
+              <a:lnSpc>
+                <a:spcPct val="120000"/>
+              </a:lnSpc>
+              <a:spcBef>
+                <a:spcPts val="400"/>
+              </a:spcBef>
+              <a:buNone/>
+            </a:pPr>
+            <a:r>
+              <a:rPr lang="en-US" sz="1800" dirty="0" smtClean="0">
+                <a:latin typeface="Consolas" panose="020B0609020204030204" pitchFamily="49" charset="0"/>
+                <a:cs typeface="Courier New" panose="02070309020205020404" pitchFamily="49" charset="0"/>
+              </a:rPr>
+              <a:t>  </a:t>
+            </a:r>
+            <a:r>
+              <a:rPr lang="en-US" sz="1800" b="1" dirty="0" smtClean="0">
+                <a:solidFill>
+                  <a:srgbClr val="920049"/>
+                </a:solidFill>
+                <a:latin typeface="Consolas" panose="020B0609020204030204" pitchFamily="49" charset="0"/>
+                <a:cs typeface="Courier New" panose="02070309020205020404" pitchFamily="49" charset="0"/>
+              </a:rPr>
+              <a:t>returns (</a:t>
+            </a:r>
+            <a:r>
+              <a:rPr lang="en-US" sz="1800" dirty="0" err="1" smtClean="0">
+                <a:latin typeface="Consolas" panose="020B0609020204030204" pitchFamily="49" charset="0"/>
+                <a:cs typeface="Courier New" panose="02070309020205020404" pitchFamily="49" charset="0"/>
+              </a:rPr>
+              <a:t>doi_on</a:t>
+            </a:r>
+            <a:r>
+              <a:rPr lang="en-US" sz="1800" b="1" dirty="0" smtClean="0">
+                <a:solidFill>
+                  <a:srgbClr val="920049"/>
+                </a:solidFill>
+                <a:latin typeface="Consolas" panose="020B0609020204030204" pitchFamily="49" charset="0"/>
+                <a:cs typeface="Courier New" panose="02070309020205020404" pitchFamily="49" charset="0"/>
+              </a:rPr>
+              <a:t>: bool);</a:t>
+            </a:r>
+          </a:p>
+          <a:p>
+            <a:pPr marL="0" indent="0">
+              <a:lnSpc>
+                <a:spcPct val="120000"/>
+              </a:lnSpc>
+              <a:spcBef>
+                <a:spcPts val="400"/>
+              </a:spcBef>
+              <a:buNone/>
+            </a:pPr>
+            <a:r>
+              <a:rPr lang="en-US" sz="1800" dirty="0" smtClean="0">
+                <a:latin typeface="Consolas" panose="020B0609020204030204" pitchFamily="49" charset="0"/>
+                <a:cs typeface="Courier New" panose="02070309020205020404" pitchFamily="49" charset="0"/>
+              </a:rPr>
+              <a:t>     </a:t>
+            </a:r>
+            <a:r>
+              <a:rPr lang="en-US" sz="1800" b="1" dirty="0" err="1" smtClean="0">
+                <a:solidFill>
+                  <a:srgbClr val="920049"/>
+                </a:solidFill>
+                <a:latin typeface="Consolas" panose="020B0609020204030204" pitchFamily="49" charset="0"/>
+                <a:cs typeface="Courier New" panose="02070309020205020404" pitchFamily="49" charset="0"/>
+              </a:rPr>
+              <a:t>var</a:t>
+            </a:r>
+            <a:endParaRPr lang="en-US" sz="1800" b="1" dirty="0">
+              <a:solidFill>
+                <a:srgbClr val="920049"/>
+              </a:solidFill>
+              <a:latin typeface="Consolas" panose="020B0609020204030204" pitchFamily="49" charset="0"/>
+              <a:cs typeface="Courier New" panose="02070309020205020404" pitchFamily="49" charset="0"/>
+            </a:endParaRPr>
+          </a:p>
+          <a:p>
+            <a:pPr marL="0" indent="0">
+              <a:lnSpc>
+                <a:spcPct val="120000"/>
+              </a:lnSpc>
+              <a:spcBef>
+                <a:spcPts val="400"/>
+              </a:spcBef>
+              <a:buNone/>
+            </a:pPr>
+            <a:r>
+              <a:rPr lang="en-US" sz="1800" dirty="0" smtClean="0">
+                <a:latin typeface="Consolas" panose="020B0609020204030204" pitchFamily="49" charset="0"/>
+                <a:cs typeface="Courier New" panose="02070309020205020404" pitchFamily="49" charset="0"/>
+              </a:rPr>
+              <a:t>	 a1_below</a:t>
+            </a:r>
+            <a:r>
+              <a:rPr lang="en-US" sz="1800" b="1" dirty="0">
+                <a:solidFill>
+                  <a:srgbClr val="920049"/>
+                </a:solidFill>
+                <a:latin typeface="Consolas" panose="020B0609020204030204" pitchFamily="49" charset="0"/>
+                <a:cs typeface="Courier New" panose="02070309020205020404" pitchFamily="49" charset="0"/>
+              </a:rPr>
+              <a:t>,</a:t>
+            </a:r>
+            <a:r>
+              <a:rPr lang="en-US" sz="1800" dirty="0">
+                <a:latin typeface="Consolas" panose="020B0609020204030204" pitchFamily="49" charset="0"/>
+                <a:cs typeface="Courier New" panose="02070309020205020404" pitchFamily="49" charset="0"/>
+              </a:rPr>
+              <a:t> a2_below</a:t>
+            </a:r>
+            <a:r>
+              <a:rPr lang="en-US" sz="1800" b="1" dirty="0">
+                <a:solidFill>
+                  <a:srgbClr val="920049"/>
+                </a:solidFill>
+                <a:latin typeface="Consolas" panose="020B0609020204030204" pitchFamily="49" charset="0"/>
+                <a:cs typeface="Courier New" panose="02070309020205020404" pitchFamily="49" charset="0"/>
+              </a:rPr>
+              <a:t>,</a:t>
+            </a:r>
+            <a:r>
+              <a:rPr lang="en-US" sz="1800" dirty="0">
+                <a:latin typeface="Consolas" panose="020B0609020204030204" pitchFamily="49" charset="0"/>
+                <a:cs typeface="Courier New" panose="02070309020205020404" pitchFamily="49" charset="0"/>
+              </a:rPr>
+              <a:t> a1_above</a:t>
+            </a:r>
+            <a:r>
+              <a:rPr lang="en-US" sz="1800" b="1" dirty="0">
+                <a:solidFill>
+                  <a:srgbClr val="920049"/>
+                </a:solidFill>
+                <a:latin typeface="Consolas" panose="020B0609020204030204" pitchFamily="49" charset="0"/>
+                <a:cs typeface="Courier New" panose="02070309020205020404" pitchFamily="49" charset="0"/>
+              </a:rPr>
+              <a:t>,</a:t>
+            </a:r>
+            <a:r>
+              <a:rPr lang="en-US" sz="1800" dirty="0">
+                <a:latin typeface="Consolas" panose="020B0609020204030204" pitchFamily="49" charset="0"/>
+                <a:cs typeface="Courier New" panose="02070309020205020404" pitchFamily="49" charset="0"/>
+              </a:rPr>
+              <a:t> a2_above</a:t>
+            </a:r>
+            <a:r>
+              <a:rPr lang="en-US" sz="1800" b="1" dirty="0">
+                <a:solidFill>
+                  <a:srgbClr val="920049"/>
+                </a:solidFill>
+                <a:latin typeface="Consolas" panose="020B0609020204030204" pitchFamily="49" charset="0"/>
+                <a:cs typeface="Courier New" panose="02070309020205020404" pitchFamily="49" charset="0"/>
+              </a:rPr>
+              <a:t>,</a:t>
+            </a:r>
+          </a:p>
+          <a:p>
+            <a:pPr marL="0" indent="0">
+              <a:lnSpc>
+                <a:spcPct val="120000"/>
+              </a:lnSpc>
+              <a:spcBef>
+                <a:spcPts val="400"/>
+              </a:spcBef>
+              <a:buNone/>
+            </a:pPr>
+            <a:r>
+              <a:rPr lang="en-US" sz="1800" dirty="0" smtClean="0">
+                <a:latin typeface="Consolas" panose="020B0609020204030204" pitchFamily="49" charset="0"/>
+                <a:cs typeface="Courier New" panose="02070309020205020404" pitchFamily="49" charset="0"/>
+              </a:rPr>
+              <a:t>	 below</a:t>
+            </a:r>
+            <a:r>
+              <a:rPr lang="en-US" sz="1800" b="1" dirty="0">
+                <a:solidFill>
+                  <a:srgbClr val="920049"/>
+                </a:solidFill>
+                <a:latin typeface="Consolas" panose="020B0609020204030204" pitchFamily="49" charset="0"/>
+                <a:cs typeface="Courier New" panose="02070309020205020404" pitchFamily="49" charset="0"/>
+              </a:rPr>
+              <a:t>,</a:t>
+            </a:r>
+            <a:r>
+              <a:rPr lang="en-US" sz="1800" dirty="0">
+                <a:latin typeface="Consolas" panose="020B0609020204030204" pitchFamily="49" charset="0"/>
+                <a:cs typeface="Courier New" panose="02070309020205020404" pitchFamily="49" charset="0"/>
+              </a:rPr>
+              <a:t> </a:t>
+            </a:r>
+            <a:r>
+              <a:rPr lang="en-US" sz="1800" dirty="0" err="1">
+                <a:latin typeface="Consolas" panose="020B0609020204030204" pitchFamily="49" charset="0"/>
+                <a:cs typeface="Courier New" panose="02070309020205020404" pitchFamily="49" charset="0"/>
+              </a:rPr>
+              <a:t>above_hyst</a:t>
+            </a:r>
+            <a:r>
+              <a:rPr lang="en-US" sz="1800" b="1" dirty="0">
+                <a:solidFill>
+                  <a:srgbClr val="920049"/>
+                </a:solidFill>
+                <a:latin typeface="Consolas" panose="020B0609020204030204" pitchFamily="49" charset="0"/>
+                <a:cs typeface="Courier New" panose="02070309020205020404" pitchFamily="49" charset="0"/>
+              </a:rPr>
+              <a:t>,</a:t>
+            </a:r>
+            <a:r>
+              <a:rPr lang="en-US" sz="1800" dirty="0">
+                <a:latin typeface="Consolas" panose="020B0609020204030204" pitchFamily="49" charset="0"/>
+                <a:cs typeface="Courier New" panose="02070309020205020404" pitchFamily="49" charset="0"/>
+              </a:rPr>
+              <a:t> d1</a:t>
+            </a:r>
+            <a:r>
+              <a:rPr lang="en-US" sz="1800" b="1" dirty="0">
+                <a:solidFill>
+                  <a:srgbClr val="920049"/>
+                </a:solidFill>
+                <a:latin typeface="Consolas" panose="020B0609020204030204" pitchFamily="49" charset="0"/>
+                <a:cs typeface="Courier New" panose="02070309020205020404" pitchFamily="49" charset="0"/>
+              </a:rPr>
+              <a:t>,</a:t>
+            </a:r>
+            <a:r>
+              <a:rPr lang="en-US" sz="1800" dirty="0">
+                <a:latin typeface="Consolas" panose="020B0609020204030204" pitchFamily="49" charset="0"/>
+                <a:cs typeface="Courier New" panose="02070309020205020404" pitchFamily="49" charset="0"/>
+              </a:rPr>
+              <a:t> d2</a:t>
+            </a:r>
+            <a:r>
+              <a:rPr lang="en-US" sz="1800" b="1" dirty="0">
+                <a:solidFill>
+                  <a:srgbClr val="D20069"/>
+                </a:solidFill>
+                <a:latin typeface="Consolas" panose="020B0609020204030204" pitchFamily="49" charset="0"/>
+                <a:cs typeface="Courier New" panose="02070309020205020404" pitchFamily="49" charset="0"/>
+              </a:rPr>
+              <a:t>:</a:t>
+            </a:r>
+            <a:r>
+              <a:rPr lang="en-US" sz="1800" b="1" dirty="0">
+                <a:solidFill>
+                  <a:srgbClr val="920049"/>
+                </a:solidFill>
+                <a:latin typeface="Consolas" panose="020B0609020204030204" pitchFamily="49" charset="0"/>
+                <a:cs typeface="Courier New" panose="02070309020205020404" pitchFamily="49" charset="0"/>
+              </a:rPr>
+              <a:t> bool</a:t>
+            </a:r>
+            <a:r>
+              <a:rPr lang="en-US" sz="1800" dirty="0">
+                <a:solidFill>
+                  <a:srgbClr val="920049"/>
+                </a:solidFill>
+                <a:latin typeface="Consolas" panose="020B0609020204030204" pitchFamily="49" charset="0"/>
+                <a:cs typeface="Courier New" panose="02070309020205020404" pitchFamily="49" charset="0"/>
+              </a:rPr>
+              <a:t>;</a:t>
+            </a:r>
+          </a:p>
+          <a:p>
+            <a:pPr marL="0" indent="0">
+              <a:lnSpc>
+                <a:spcPct val="120000"/>
+              </a:lnSpc>
+              <a:spcBef>
+                <a:spcPts val="400"/>
+              </a:spcBef>
+              <a:buNone/>
+            </a:pPr>
+            <a:r>
+              <a:rPr lang="en-US" sz="1800" dirty="0">
+                <a:latin typeface="Consolas" panose="020B0609020204030204" pitchFamily="49" charset="0"/>
+                <a:cs typeface="Courier New" panose="02070309020205020404" pitchFamily="49" charset="0"/>
+              </a:rPr>
+              <a:t> </a:t>
+            </a:r>
+            <a:r>
+              <a:rPr lang="en-US" sz="1800" dirty="0" smtClean="0">
+                <a:latin typeface="Consolas" panose="020B0609020204030204" pitchFamily="49" charset="0"/>
+                <a:cs typeface="Courier New" panose="02070309020205020404" pitchFamily="49" charset="0"/>
+              </a:rPr>
+              <a:t>    </a:t>
+            </a:r>
+            <a:r>
+              <a:rPr lang="en-US" sz="1800" b="1" dirty="0" smtClean="0">
+                <a:solidFill>
+                  <a:srgbClr val="920049"/>
+                </a:solidFill>
+                <a:latin typeface="Consolas" panose="020B0609020204030204" pitchFamily="49" charset="0"/>
+                <a:cs typeface="Courier New" panose="02070309020205020404" pitchFamily="49" charset="0"/>
+              </a:rPr>
+              <a:t>let</a:t>
+            </a:r>
+            <a:endParaRPr lang="en-US" sz="1800" b="1" dirty="0">
+              <a:solidFill>
+                <a:srgbClr val="920049"/>
+              </a:solidFill>
+              <a:latin typeface="Consolas" panose="020B0609020204030204" pitchFamily="49" charset="0"/>
+              <a:cs typeface="Courier New" panose="02070309020205020404" pitchFamily="49" charset="0"/>
+            </a:endParaRPr>
+          </a:p>
+          <a:p>
+            <a:pPr marL="0" indent="0">
+              <a:lnSpc>
+                <a:spcPct val="120000"/>
+              </a:lnSpc>
+              <a:spcBef>
+                <a:spcPts val="400"/>
+              </a:spcBef>
+              <a:buNone/>
+            </a:pPr>
+            <a:r>
+              <a:rPr lang="en-US" sz="1800" dirty="0" smtClean="0">
+                <a:latin typeface="Consolas" panose="020B0609020204030204" pitchFamily="49" charset="0"/>
+                <a:cs typeface="Courier New" panose="02070309020205020404" pitchFamily="49" charset="0"/>
+              </a:rPr>
+              <a:t>	 a1_below </a:t>
+            </a:r>
+            <a:r>
+              <a:rPr lang="en-US" sz="1800" b="1" dirty="0">
+                <a:solidFill>
+                  <a:srgbClr val="920049"/>
+                </a:solidFill>
+                <a:latin typeface="Consolas" panose="020B0609020204030204" pitchFamily="49" charset="0"/>
+                <a:cs typeface="Courier New" panose="02070309020205020404" pitchFamily="49" charset="0"/>
+              </a:rPr>
+              <a:t>= (</a:t>
+            </a:r>
+            <a:r>
+              <a:rPr lang="en-US" sz="1800" dirty="0">
+                <a:latin typeface="Consolas" panose="020B0609020204030204" pitchFamily="49" charset="0"/>
+                <a:cs typeface="Courier New" panose="02070309020205020404" pitchFamily="49" charset="0"/>
+              </a:rPr>
+              <a:t>alt1 </a:t>
+            </a:r>
+            <a:r>
+              <a:rPr lang="en-US" sz="1800" b="1" dirty="0">
+                <a:solidFill>
+                  <a:srgbClr val="920049"/>
+                </a:solidFill>
+                <a:latin typeface="Consolas" panose="020B0609020204030204" pitchFamily="49" charset="0"/>
+                <a:cs typeface="Courier New" panose="02070309020205020404" pitchFamily="49" charset="0"/>
+              </a:rPr>
+              <a:t>&lt;</a:t>
+            </a:r>
+            <a:r>
+              <a:rPr lang="en-US" sz="1800" dirty="0">
+                <a:latin typeface="Consolas" panose="020B0609020204030204" pitchFamily="49" charset="0"/>
+                <a:cs typeface="Courier New" panose="02070309020205020404" pitchFamily="49" charset="0"/>
+              </a:rPr>
+              <a:t> THRESHOLD</a:t>
+            </a:r>
+            <a:r>
+              <a:rPr lang="en-US" sz="1800" b="1" dirty="0">
+                <a:solidFill>
+                  <a:srgbClr val="920049"/>
+                </a:solidFill>
+                <a:latin typeface="Consolas" panose="020B0609020204030204" pitchFamily="49" charset="0"/>
+                <a:cs typeface="Courier New" panose="02070309020205020404" pitchFamily="49" charset="0"/>
+              </a:rPr>
+              <a:t>);</a:t>
+            </a:r>
+            <a:r>
+              <a:rPr lang="en-US" sz="1800" dirty="0">
+                <a:latin typeface="Consolas" panose="020B0609020204030204" pitchFamily="49" charset="0"/>
+                <a:cs typeface="Courier New" panose="02070309020205020404" pitchFamily="49" charset="0"/>
+              </a:rPr>
+              <a:t> </a:t>
+            </a:r>
+            <a:r>
+              <a:rPr lang="en-US" sz="1800" dirty="0" smtClean="0">
+                <a:latin typeface="Consolas" panose="020B0609020204030204" pitchFamily="49" charset="0"/>
+                <a:cs typeface="Courier New" panose="02070309020205020404" pitchFamily="49" charset="0"/>
+              </a:rPr>
+              <a:t>       </a:t>
+            </a:r>
+            <a:endParaRPr lang="en-US" sz="1800" dirty="0">
+              <a:latin typeface="Consolas" panose="020B0609020204030204" pitchFamily="49" charset="0"/>
+              <a:cs typeface="Courier New" panose="02070309020205020404" pitchFamily="49" charset="0"/>
+            </a:endParaRPr>
+          </a:p>
+          <a:p>
+            <a:pPr marL="0" indent="0">
+              <a:lnSpc>
+                <a:spcPct val="120000"/>
+              </a:lnSpc>
+              <a:spcBef>
+                <a:spcPts val="400"/>
+              </a:spcBef>
+              <a:buNone/>
+            </a:pPr>
+            <a:r>
+              <a:rPr lang="en-US" sz="1800" dirty="0" smtClean="0">
+                <a:latin typeface="Consolas" panose="020B0609020204030204" pitchFamily="49" charset="0"/>
+                <a:cs typeface="Courier New" panose="02070309020205020404" pitchFamily="49" charset="0"/>
+              </a:rPr>
+              <a:t>	 a2_below </a:t>
+            </a:r>
+            <a:r>
+              <a:rPr lang="en-US" sz="1800" b="1" dirty="0">
+                <a:solidFill>
+                  <a:srgbClr val="920049"/>
+                </a:solidFill>
+                <a:latin typeface="Consolas" panose="020B0609020204030204" pitchFamily="49" charset="0"/>
+                <a:cs typeface="Courier New" panose="02070309020205020404" pitchFamily="49" charset="0"/>
+              </a:rPr>
+              <a:t>= (</a:t>
+            </a:r>
+            <a:r>
+              <a:rPr lang="en-US" sz="1800" dirty="0">
+                <a:latin typeface="Consolas" panose="020B0609020204030204" pitchFamily="49" charset="0"/>
+                <a:cs typeface="Courier New" panose="02070309020205020404" pitchFamily="49" charset="0"/>
+              </a:rPr>
+              <a:t>alt2 </a:t>
+            </a:r>
+            <a:r>
+              <a:rPr lang="en-US" sz="1800" b="1" dirty="0">
+                <a:solidFill>
+                  <a:srgbClr val="920049"/>
+                </a:solidFill>
+                <a:latin typeface="Consolas" panose="020B0609020204030204" pitchFamily="49" charset="0"/>
+                <a:cs typeface="Courier New" panose="02070309020205020404" pitchFamily="49" charset="0"/>
+              </a:rPr>
+              <a:t>&lt;</a:t>
+            </a:r>
+            <a:r>
+              <a:rPr lang="en-US" sz="1800" dirty="0">
+                <a:latin typeface="Consolas" panose="020B0609020204030204" pitchFamily="49" charset="0"/>
+                <a:cs typeface="Courier New" panose="02070309020205020404" pitchFamily="49" charset="0"/>
+              </a:rPr>
+              <a:t> THRESHOLD</a:t>
+            </a:r>
+            <a:r>
+              <a:rPr lang="en-US" sz="1800" b="1" dirty="0">
+                <a:solidFill>
+                  <a:srgbClr val="920049"/>
+                </a:solidFill>
+                <a:latin typeface="Consolas" panose="020B0609020204030204" pitchFamily="49" charset="0"/>
+                <a:cs typeface="Courier New" panose="02070309020205020404" pitchFamily="49" charset="0"/>
+              </a:rPr>
+              <a:t>);</a:t>
+            </a:r>
+            <a:r>
+              <a:rPr lang="en-US" sz="1800" dirty="0">
+                <a:latin typeface="Consolas" panose="020B0609020204030204" pitchFamily="49" charset="0"/>
+                <a:cs typeface="Courier New" panose="02070309020205020404" pitchFamily="49" charset="0"/>
+              </a:rPr>
+              <a:t> </a:t>
+            </a:r>
+            <a:r>
+              <a:rPr lang="en-US" sz="1800" dirty="0" smtClean="0">
+                <a:latin typeface="Consolas" panose="020B0609020204030204" pitchFamily="49" charset="0"/>
+                <a:cs typeface="Courier New" panose="02070309020205020404" pitchFamily="49" charset="0"/>
+              </a:rPr>
+              <a:t>  </a:t>
+            </a:r>
+            <a:endParaRPr lang="en-US" sz="1800" dirty="0">
+              <a:latin typeface="Consolas" panose="020B0609020204030204" pitchFamily="49" charset="0"/>
+              <a:cs typeface="Courier New" panose="02070309020205020404" pitchFamily="49" charset="0"/>
+            </a:endParaRPr>
+          </a:p>
+          <a:p>
+            <a:pPr marL="0" indent="0">
+              <a:lnSpc>
+                <a:spcPct val="120000"/>
+              </a:lnSpc>
+              <a:spcBef>
+                <a:spcPts val="400"/>
+              </a:spcBef>
+              <a:buNone/>
+            </a:pPr>
+            <a:r>
+              <a:rPr lang="en-US" sz="1800" dirty="0" smtClean="0">
+                <a:latin typeface="Consolas" panose="020B0609020204030204" pitchFamily="49" charset="0"/>
+                <a:cs typeface="Courier New" panose="02070309020205020404" pitchFamily="49" charset="0"/>
+              </a:rPr>
+              <a:t>	 a1_above </a:t>
+            </a:r>
+            <a:r>
+              <a:rPr lang="en-US" sz="1800" b="1" dirty="0">
+                <a:solidFill>
+                  <a:srgbClr val="920049"/>
+                </a:solidFill>
+                <a:latin typeface="Consolas" panose="020B0609020204030204" pitchFamily="49" charset="0"/>
+                <a:cs typeface="Courier New" panose="02070309020205020404" pitchFamily="49" charset="0"/>
+              </a:rPr>
+              <a:t>= (</a:t>
+            </a:r>
+            <a:r>
+              <a:rPr lang="en-US" sz="1800" dirty="0">
+                <a:latin typeface="Consolas" panose="020B0609020204030204" pitchFamily="49" charset="0"/>
+                <a:cs typeface="Courier New" panose="02070309020205020404" pitchFamily="49" charset="0"/>
+              </a:rPr>
+              <a:t>alt1 </a:t>
+            </a:r>
+            <a:r>
+              <a:rPr lang="en-US" sz="1800" b="1" dirty="0">
+                <a:solidFill>
+                  <a:srgbClr val="920049"/>
+                </a:solidFill>
+                <a:latin typeface="Consolas" panose="020B0609020204030204" pitchFamily="49" charset="0"/>
+                <a:cs typeface="Courier New" panose="02070309020205020404" pitchFamily="49" charset="0"/>
+              </a:rPr>
+              <a:t>&gt;=</a:t>
+            </a:r>
+            <a:r>
+              <a:rPr lang="en-US" sz="1800" dirty="0">
+                <a:latin typeface="Consolas" panose="020B0609020204030204" pitchFamily="49" charset="0"/>
+                <a:cs typeface="Courier New" panose="02070309020205020404" pitchFamily="49" charset="0"/>
+              </a:rPr>
+              <a:t> T_HYST</a:t>
+            </a:r>
+            <a:r>
+              <a:rPr lang="en-US" sz="1800" b="1" dirty="0">
+                <a:solidFill>
+                  <a:srgbClr val="920049"/>
+                </a:solidFill>
+                <a:latin typeface="Consolas" panose="020B0609020204030204" pitchFamily="49" charset="0"/>
+                <a:cs typeface="Courier New" panose="02070309020205020404" pitchFamily="49" charset="0"/>
+              </a:rPr>
+              <a:t>);</a:t>
+            </a:r>
+            <a:r>
+              <a:rPr lang="en-US" sz="1800" dirty="0">
+                <a:latin typeface="Consolas" panose="020B0609020204030204" pitchFamily="49" charset="0"/>
+                <a:cs typeface="Courier New" panose="02070309020205020404" pitchFamily="49" charset="0"/>
+              </a:rPr>
+              <a:t> </a:t>
+            </a:r>
+            <a:r>
+              <a:rPr lang="en-US" sz="1800" dirty="0" smtClean="0">
+                <a:latin typeface="Consolas" panose="020B0609020204030204" pitchFamily="49" charset="0"/>
+                <a:cs typeface="Courier New" panose="02070309020205020404" pitchFamily="49" charset="0"/>
+              </a:rPr>
+              <a:t>    </a:t>
+            </a:r>
+            <a:endParaRPr lang="en-US" sz="1800" dirty="0">
+              <a:latin typeface="Consolas" panose="020B0609020204030204" pitchFamily="49" charset="0"/>
+              <a:cs typeface="Courier New" panose="02070309020205020404" pitchFamily="49" charset="0"/>
+            </a:endParaRPr>
+          </a:p>
+          <a:p>
+            <a:pPr marL="0" indent="0">
+              <a:lnSpc>
+                <a:spcPct val="120000"/>
+              </a:lnSpc>
+              <a:spcBef>
+                <a:spcPts val="400"/>
+              </a:spcBef>
+              <a:buNone/>
+            </a:pPr>
+            <a:r>
+              <a:rPr lang="en-US" sz="1800" dirty="0" smtClean="0">
+                <a:latin typeface="Consolas" panose="020B0609020204030204" pitchFamily="49" charset="0"/>
+                <a:cs typeface="Courier New" panose="02070309020205020404" pitchFamily="49" charset="0"/>
+              </a:rPr>
+              <a:t>	 a2_above </a:t>
+            </a:r>
+            <a:r>
+              <a:rPr lang="en-US" sz="1800" b="1" dirty="0">
+                <a:solidFill>
+                  <a:srgbClr val="920049"/>
+                </a:solidFill>
+                <a:latin typeface="Consolas" panose="020B0609020204030204" pitchFamily="49" charset="0"/>
+                <a:cs typeface="Courier New" panose="02070309020205020404" pitchFamily="49" charset="0"/>
+              </a:rPr>
+              <a:t>= (</a:t>
+            </a:r>
+            <a:r>
+              <a:rPr lang="en-US" sz="1800" dirty="0">
+                <a:latin typeface="Consolas" panose="020B0609020204030204" pitchFamily="49" charset="0"/>
+                <a:cs typeface="Courier New" panose="02070309020205020404" pitchFamily="49" charset="0"/>
+              </a:rPr>
+              <a:t>alt2 </a:t>
+            </a:r>
+            <a:r>
+              <a:rPr lang="en-US" sz="1800" b="1" dirty="0">
+                <a:solidFill>
+                  <a:srgbClr val="920049"/>
+                </a:solidFill>
+                <a:latin typeface="Consolas" panose="020B0609020204030204" pitchFamily="49" charset="0"/>
+                <a:cs typeface="Courier New" panose="02070309020205020404" pitchFamily="49" charset="0"/>
+              </a:rPr>
+              <a:t>&gt;=</a:t>
+            </a:r>
+            <a:r>
+              <a:rPr lang="en-US" sz="1800" dirty="0">
+                <a:latin typeface="Consolas" panose="020B0609020204030204" pitchFamily="49" charset="0"/>
+                <a:cs typeface="Courier New" panose="02070309020205020404" pitchFamily="49" charset="0"/>
+              </a:rPr>
+              <a:t> T_HYST</a:t>
+            </a:r>
+            <a:r>
+              <a:rPr lang="en-US" sz="1800" b="1" dirty="0" smtClean="0">
+                <a:solidFill>
+                  <a:srgbClr val="920049"/>
+                </a:solidFill>
+                <a:latin typeface="Consolas" panose="020B0609020204030204" pitchFamily="49" charset="0"/>
+                <a:cs typeface="Courier New" panose="02070309020205020404" pitchFamily="49" charset="0"/>
+              </a:rPr>
+              <a:t>);</a:t>
+            </a:r>
+          </a:p>
+          <a:p>
+            <a:pPr marL="0" indent="0">
+              <a:lnSpc>
+                <a:spcPct val="120000"/>
+              </a:lnSpc>
+              <a:spcBef>
+                <a:spcPts val="400"/>
+              </a:spcBef>
+              <a:buNone/>
+            </a:pPr>
+            <a:r>
+              <a:rPr lang="en-US" sz="1800" dirty="0" smtClean="0">
+                <a:latin typeface="Consolas" panose="020B0609020204030204" pitchFamily="49" charset="0"/>
+                <a:cs typeface="Courier New" panose="02070309020205020404" pitchFamily="49" charset="0"/>
+              </a:rPr>
+              <a:t>	 below </a:t>
+            </a:r>
+            <a:r>
+              <a:rPr lang="en-US" sz="1800" b="1" dirty="0">
+                <a:solidFill>
+                  <a:srgbClr val="920049"/>
+                </a:solidFill>
+                <a:latin typeface="Consolas" panose="020B0609020204030204" pitchFamily="49" charset="0"/>
+                <a:cs typeface="Courier New" panose="02070309020205020404" pitchFamily="49" charset="0"/>
+              </a:rPr>
+              <a:t>=</a:t>
+            </a:r>
+            <a:r>
+              <a:rPr lang="en-US" sz="1800" dirty="0">
+                <a:latin typeface="Consolas" panose="020B0609020204030204" pitchFamily="49" charset="0"/>
+                <a:cs typeface="Courier New" panose="02070309020205020404" pitchFamily="49" charset="0"/>
+              </a:rPr>
+              <a:t> a1_below</a:t>
+            </a:r>
+            <a:r>
+              <a:rPr lang="en-US" sz="1800" b="1" dirty="0">
+                <a:latin typeface="Consolas" panose="020B0609020204030204" pitchFamily="49" charset="0"/>
+                <a:cs typeface="Courier New" panose="02070309020205020404" pitchFamily="49" charset="0"/>
+              </a:rPr>
+              <a:t> </a:t>
+            </a:r>
+            <a:r>
+              <a:rPr lang="en-US" sz="1800" b="1" dirty="0">
+                <a:solidFill>
+                  <a:srgbClr val="920049"/>
+                </a:solidFill>
+                <a:latin typeface="Consolas" panose="020B0609020204030204" pitchFamily="49" charset="0"/>
+                <a:cs typeface="Courier New" panose="02070309020205020404" pitchFamily="49" charset="0"/>
+              </a:rPr>
+              <a:t>or</a:t>
+            </a:r>
+            <a:r>
+              <a:rPr lang="en-US" sz="1800" b="1" dirty="0">
+                <a:latin typeface="Consolas" panose="020B0609020204030204" pitchFamily="49" charset="0"/>
+                <a:cs typeface="Courier New" panose="02070309020205020404" pitchFamily="49" charset="0"/>
+              </a:rPr>
+              <a:t> </a:t>
+            </a:r>
+            <a:r>
+              <a:rPr lang="en-US" sz="1800" dirty="0">
+                <a:latin typeface="Consolas" panose="020B0609020204030204" pitchFamily="49" charset="0"/>
+                <a:cs typeface="Courier New" panose="02070309020205020404" pitchFamily="49" charset="0"/>
+              </a:rPr>
+              <a:t>a2_below</a:t>
+            </a:r>
+            <a:r>
+              <a:rPr lang="en-US" sz="1800" b="1" dirty="0">
+                <a:solidFill>
+                  <a:srgbClr val="920049"/>
+                </a:solidFill>
+                <a:latin typeface="Consolas" panose="020B0609020204030204" pitchFamily="49" charset="0"/>
+                <a:cs typeface="Courier New" panose="02070309020205020404" pitchFamily="49" charset="0"/>
+              </a:rPr>
+              <a:t>;</a:t>
+            </a:r>
+            <a:r>
+              <a:rPr lang="en-US" sz="1800" dirty="0">
+                <a:latin typeface="Consolas" panose="020B0609020204030204" pitchFamily="49" charset="0"/>
+                <a:cs typeface="Courier New" panose="02070309020205020404" pitchFamily="49" charset="0"/>
+              </a:rPr>
+              <a:t> </a:t>
+            </a:r>
+            <a:r>
+              <a:rPr lang="en-US" sz="1800" dirty="0" smtClean="0">
+                <a:latin typeface="Consolas" panose="020B0609020204030204" pitchFamily="49" charset="0"/>
+                <a:cs typeface="Courier New" panose="02070309020205020404" pitchFamily="49" charset="0"/>
+              </a:rPr>
+              <a:t>        </a:t>
+            </a:r>
+            <a:endParaRPr lang="en-US" sz="1800" dirty="0">
+              <a:latin typeface="Consolas" panose="020B0609020204030204" pitchFamily="49" charset="0"/>
+              <a:cs typeface="Courier New" panose="02070309020205020404" pitchFamily="49" charset="0"/>
+            </a:endParaRPr>
+          </a:p>
+          <a:p>
+            <a:pPr marL="0" indent="0">
+              <a:lnSpc>
+                <a:spcPct val="120000"/>
+              </a:lnSpc>
+              <a:spcBef>
+                <a:spcPts val="400"/>
+              </a:spcBef>
+              <a:buNone/>
+            </a:pPr>
+            <a:r>
+              <a:rPr lang="en-US" sz="1800" dirty="0" smtClean="0">
+                <a:latin typeface="Consolas" panose="020B0609020204030204" pitchFamily="49" charset="0"/>
+                <a:cs typeface="Courier New" panose="02070309020205020404" pitchFamily="49" charset="0"/>
+              </a:rPr>
+              <a:t>	 </a:t>
+            </a:r>
+            <a:r>
+              <a:rPr lang="en-US" sz="1800" dirty="0" err="1" smtClean="0">
+                <a:latin typeface="Consolas" panose="020B0609020204030204" pitchFamily="49" charset="0"/>
+                <a:cs typeface="Courier New" panose="02070309020205020404" pitchFamily="49" charset="0"/>
+              </a:rPr>
+              <a:t>above_hyst</a:t>
+            </a:r>
+            <a:r>
+              <a:rPr lang="en-US" sz="1800" dirty="0" smtClean="0">
+                <a:latin typeface="Consolas" panose="020B0609020204030204" pitchFamily="49" charset="0"/>
+                <a:cs typeface="Courier New" panose="02070309020205020404" pitchFamily="49" charset="0"/>
+              </a:rPr>
+              <a:t> </a:t>
+            </a:r>
+            <a:r>
+              <a:rPr lang="en-US" sz="1800" b="1" dirty="0">
+                <a:solidFill>
+                  <a:srgbClr val="920049"/>
+                </a:solidFill>
+                <a:latin typeface="Consolas" panose="020B0609020204030204" pitchFamily="49" charset="0"/>
+                <a:cs typeface="Courier New" panose="02070309020205020404" pitchFamily="49" charset="0"/>
+              </a:rPr>
+              <a:t>=</a:t>
+            </a:r>
+            <a:r>
+              <a:rPr lang="en-US" sz="1800" dirty="0">
+                <a:latin typeface="Consolas" panose="020B0609020204030204" pitchFamily="49" charset="0"/>
+                <a:cs typeface="Courier New" panose="02070309020205020404" pitchFamily="49" charset="0"/>
+              </a:rPr>
+              <a:t> a1_above </a:t>
+            </a:r>
+            <a:r>
+              <a:rPr lang="en-US" sz="1800" b="1" dirty="0">
+                <a:solidFill>
+                  <a:srgbClr val="920049"/>
+                </a:solidFill>
+                <a:latin typeface="Consolas" panose="020B0609020204030204" pitchFamily="49" charset="0"/>
+                <a:cs typeface="Courier New" panose="02070309020205020404" pitchFamily="49" charset="0"/>
+              </a:rPr>
+              <a:t>and</a:t>
+            </a:r>
+            <a:r>
+              <a:rPr lang="en-US" sz="1800" dirty="0">
+                <a:latin typeface="Consolas" panose="020B0609020204030204" pitchFamily="49" charset="0"/>
+                <a:cs typeface="Courier New" panose="02070309020205020404" pitchFamily="49" charset="0"/>
+              </a:rPr>
+              <a:t> a2_above</a:t>
+            </a:r>
+            <a:r>
+              <a:rPr lang="en-US" sz="1800" b="1" dirty="0">
+                <a:solidFill>
+                  <a:srgbClr val="920049"/>
+                </a:solidFill>
+                <a:latin typeface="Consolas" panose="020B0609020204030204" pitchFamily="49" charset="0"/>
+                <a:cs typeface="Courier New" panose="02070309020205020404" pitchFamily="49" charset="0"/>
+              </a:rPr>
+              <a:t>;</a:t>
+            </a:r>
+            <a:r>
+              <a:rPr lang="en-US" sz="1800" dirty="0">
+                <a:latin typeface="Consolas" panose="020B0609020204030204" pitchFamily="49" charset="0"/>
+                <a:cs typeface="Courier New" panose="02070309020205020404" pitchFamily="49" charset="0"/>
+              </a:rPr>
+              <a:t> </a:t>
+            </a:r>
+            <a:r>
+              <a:rPr lang="en-US" sz="1800" dirty="0" smtClean="0">
+                <a:latin typeface="Consolas" panose="020B0609020204030204" pitchFamily="49" charset="0"/>
+                <a:cs typeface="Courier New" panose="02070309020205020404" pitchFamily="49" charset="0"/>
+              </a:rPr>
+              <a:t>   </a:t>
+            </a:r>
+            <a:endParaRPr lang="en-US" sz="1800" dirty="0">
+              <a:latin typeface="Consolas" panose="020B0609020204030204" pitchFamily="49" charset="0"/>
+              <a:cs typeface="Courier New" panose="02070309020205020404" pitchFamily="49" charset="0"/>
+            </a:endParaRPr>
+          </a:p>
+          <a:p>
+            <a:pPr marL="0" indent="0">
+              <a:lnSpc>
+                <a:spcPct val="120000"/>
+              </a:lnSpc>
+              <a:spcBef>
+                <a:spcPts val="400"/>
+              </a:spcBef>
+              <a:buNone/>
+            </a:pPr>
+            <a:r>
+              <a:rPr lang="en-US" sz="1800" dirty="0" smtClean="0">
+                <a:latin typeface="Consolas" panose="020B0609020204030204" pitchFamily="49" charset="0"/>
+                <a:cs typeface="Courier New" panose="02070309020205020404" pitchFamily="49" charset="0"/>
+              </a:rPr>
+              <a:t>	 </a:t>
+            </a:r>
+            <a:r>
+              <a:rPr lang="en-US" sz="1800" dirty="0" err="1" smtClean="0">
+                <a:latin typeface="Consolas" panose="020B0609020204030204" pitchFamily="49" charset="0"/>
+                <a:cs typeface="Courier New" panose="02070309020205020404" pitchFamily="49" charset="0"/>
+              </a:rPr>
+              <a:t>doi_on</a:t>
+            </a:r>
+            <a:r>
+              <a:rPr lang="en-US" sz="1800" dirty="0" smtClean="0">
+                <a:latin typeface="Consolas" panose="020B0609020204030204" pitchFamily="49" charset="0"/>
+                <a:cs typeface="Courier New" panose="02070309020205020404" pitchFamily="49" charset="0"/>
+              </a:rPr>
+              <a:t> </a:t>
+            </a:r>
+            <a:r>
+              <a:rPr lang="en-US" sz="1800" b="1" dirty="0">
+                <a:solidFill>
+                  <a:srgbClr val="920049"/>
+                </a:solidFill>
+                <a:latin typeface="Consolas" panose="020B0609020204030204" pitchFamily="49" charset="0"/>
+                <a:cs typeface="Courier New" panose="02070309020205020404" pitchFamily="49" charset="0"/>
+              </a:rPr>
+              <a:t>= if (</a:t>
+            </a:r>
+            <a:r>
+              <a:rPr lang="en-US" sz="1800" dirty="0">
+                <a:latin typeface="Consolas" panose="020B0609020204030204" pitchFamily="49" charset="0"/>
+                <a:cs typeface="Courier New" panose="02070309020205020404" pitchFamily="49" charset="0"/>
+              </a:rPr>
+              <a:t>below </a:t>
+            </a:r>
+            <a:r>
+              <a:rPr lang="en-US" sz="1800" b="1" dirty="0">
+                <a:solidFill>
+                  <a:srgbClr val="920049"/>
+                </a:solidFill>
+                <a:latin typeface="Consolas" panose="020B0609020204030204" pitchFamily="49" charset="0"/>
+                <a:cs typeface="Courier New" panose="02070309020205020404" pitchFamily="49" charset="0"/>
+              </a:rPr>
+              <a:t>and not </a:t>
+            </a:r>
+            <a:r>
+              <a:rPr lang="en-US" sz="1800" dirty="0" smtClean="0">
+                <a:latin typeface="Consolas" panose="020B0609020204030204" pitchFamily="49" charset="0"/>
+                <a:cs typeface="Courier New" panose="02070309020205020404" pitchFamily="49" charset="0"/>
+              </a:rPr>
+              <a:t>inhibit</a:t>
+            </a:r>
+            <a:r>
+              <a:rPr lang="en-US" sz="1800" b="1" dirty="0" smtClean="0">
+                <a:solidFill>
+                  <a:srgbClr val="920049"/>
+                </a:solidFill>
+                <a:latin typeface="Consolas" panose="020B0609020204030204" pitchFamily="49" charset="0"/>
+                <a:cs typeface="Courier New" panose="02070309020205020404" pitchFamily="49" charset="0"/>
+              </a:rPr>
+              <a:t>)</a:t>
+            </a:r>
+            <a:r>
+              <a:rPr lang="en-US" sz="1800" dirty="0" smtClean="0">
+                <a:latin typeface="Consolas" panose="020B0609020204030204" pitchFamily="49" charset="0"/>
+                <a:cs typeface="Courier New" panose="02070309020205020404" pitchFamily="49" charset="0"/>
+              </a:rPr>
+              <a:t/>
+            </a:r>
+            <a:br>
+              <a:rPr lang="en-US" sz="1800" dirty="0" smtClean="0">
+                <a:latin typeface="Consolas" panose="020B0609020204030204" pitchFamily="49" charset="0"/>
+                <a:cs typeface="Courier New" panose="02070309020205020404" pitchFamily="49" charset="0"/>
+              </a:rPr>
+            </a:br>
+            <a:r>
+              <a:rPr lang="en-US" sz="1800" dirty="0" smtClean="0">
+                <a:latin typeface="Consolas" panose="020B0609020204030204" pitchFamily="49" charset="0"/>
+                <a:cs typeface="Courier New" panose="02070309020205020404" pitchFamily="49" charset="0"/>
+              </a:rPr>
+              <a:t>                  </a:t>
+            </a:r>
+            <a:r>
+              <a:rPr lang="en-US" sz="1800" b="1" dirty="0" smtClean="0">
+                <a:solidFill>
+                  <a:srgbClr val="920049"/>
+                </a:solidFill>
+                <a:latin typeface="Consolas" panose="020B0609020204030204" pitchFamily="49" charset="0"/>
+                <a:cs typeface="Courier New" panose="02070309020205020404" pitchFamily="49" charset="0"/>
+              </a:rPr>
+              <a:t>then</a:t>
+            </a:r>
+            <a:r>
+              <a:rPr lang="en-US" sz="1800" dirty="0" smtClean="0">
+                <a:solidFill>
+                  <a:srgbClr val="920049"/>
+                </a:solidFill>
+                <a:latin typeface="Consolas" panose="020B0609020204030204" pitchFamily="49" charset="0"/>
+                <a:cs typeface="Courier New" panose="02070309020205020404" pitchFamily="49" charset="0"/>
+              </a:rPr>
+              <a:t> </a:t>
+            </a:r>
+            <a:r>
+              <a:rPr lang="en-US" sz="1800" b="1" dirty="0">
+                <a:solidFill>
+                  <a:srgbClr val="920049"/>
+                </a:solidFill>
+                <a:latin typeface="Consolas" panose="020B0609020204030204" pitchFamily="49" charset="0"/>
+                <a:cs typeface="Courier New" panose="02070309020205020404" pitchFamily="49" charset="0"/>
+              </a:rPr>
+              <a:t>true</a:t>
+            </a:r>
+            <a:r>
+              <a:rPr lang="en-US" sz="1800" dirty="0">
+                <a:solidFill>
+                  <a:srgbClr val="920049"/>
+                </a:solidFill>
+                <a:latin typeface="Consolas" panose="020B0609020204030204" pitchFamily="49" charset="0"/>
+                <a:cs typeface="Courier New" panose="02070309020205020404" pitchFamily="49" charset="0"/>
+              </a:rPr>
+              <a:t> </a:t>
+            </a:r>
+            <a:r>
+              <a:rPr lang="en-US" sz="1800" b="1" dirty="0">
+                <a:solidFill>
+                  <a:srgbClr val="920049"/>
+                </a:solidFill>
+                <a:latin typeface="Consolas" panose="020B0609020204030204" pitchFamily="49" charset="0"/>
+                <a:cs typeface="Courier New" panose="02070309020205020404" pitchFamily="49" charset="0"/>
+              </a:rPr>
+              <a:t>else</a:t>
+            </a:r>
+            <a:r>
+              <a:rPr lang="en-US" sz="1800" dirty="0">
+                <a:solidFill>
+                  <a:srgbClr val="920049"/>
+                </a:solidFill>
+                <a:latin typeface="Consolas" panose="020B0609020204030204" pitchFamily="49" charset="0"/>
+                <a:cs typeface="Courier New" panose="02070309020205020404" pitchFamily="49" charset="0"/>
+              </a:rPr>
+              <a:t> </a:t>
+            </a:r>
+            <a:r>
+              <a:rPr lang="en-US" sz="1800" dirty="0">
+                <a:latin typeface="Consolas" panose="020B0609020204030204" pitchFamily="49" charset="0"/>
+                <a:cs typeface="Courier New" panose="02070309020205020404" pitchFamily="49" charset="0"/>
+              </a:rPr>
+              <a:t>d1</a:t>
+            </a:r>
+            <a:r>
+              <a:rPr lang="en-US" sz="1800" dirty="0">
+                <a:solidFill>
+                  <a:srgbClr val="920049"/>
+                </a:solidFill>
+                <a:latin typeface="Consolas" panose="020B0609020204030204" pitchFamily="49" charset="0"/>
+                <a:cs typeface="Courier New" panose="02070309020205020404" pitchFamily="49" charset="0"/>
+              </a:rPr>
+              <a:t>;</a:t>
+            </a:r>
+          </a:p>
+          <a:p>
+            <a:pPr marL="0" indent="0">
+              <a:lnSpc>
+                <a:spcPct val="120000"/>
+              </a:lnSpc>
+              <a:spcBef>
+                <a:spcPts val="400"/>
+              </a:spcBef>
+              <a:buNone/>
+            </a:pPr>
+            <a:r>
+              <a:rPr lang="en-US" sz="1800" dirty="0" smtClean="0">
+                <a:latin typeface="Consolas" panose="020B0609020204030204" pitchFamily="49" charset="0"/>
+                <a:cs typeface="Courier New" panose="02070309020205020404" pitchFamily="49" charset="0"/>
+              </a:rPr>
+              <a:t>	 d1 </a:t>
+            </a:r>
+            <a:r>
+              <a:rPr lang="en-US" sz="1800" b="1" dirty="0">
+                <a:solidFill>
+                  <a:srgbClr val="920049"/>
+                </a:solidFill>
+                <a:latin typeface="Consolas" panose="020B0609020204030204" pitchFamily="49" charset="0"/>
+                <a:cs typeface="Courier New" panose="02070309020205020404" pitchFamily="49" charset="0"/>
+              </a:rPr>
+              <a:t>= if (</a:t>
+            </a:r>
+            <a:r>
+              <a:rPr lang="en-US" sz="1800" dirty="0">
+                <a:latin typeface="Consolas" panose="020B0609020204030204" pitchFamily="49" charset="0"/>
+                <a:cs typeface="Courier New" panose="02070309020205020404" pitchFamily="49" charset="0"/>
+              </a:rPr>
+              <a:t>inhibit </a:t>
+            </a:r>
+            <a:r>
+              <a:rPr lang="en-US" sz="1800" b="1" dirty="0">
+                <a:solidFill>
+                  <a:srgbClr val="920049"/>
+                </a:solidFill>
+                <a:latin typeface="Consolas" panose="020B0609020204030204" pitchFamily="49" charset="0"/>
+                <a:cs typeface="Courier New" panose="02070309020205020404" pitchFamily="49" charset="0"/>
+              </a:rPr>
+              <a:t>or</a:t>
+            </a:r>
+            <a:r>
+              <a:rPr lang="en-US" sz="1800" dirty="0">
+                <a:latin typeface="Consolas" panose="020B0609020204030204" pitchFamily="49" charset="0"/>
+                <a:cs typeface="Courier New" panose="02070309020205020404" pitchFamily="49" charset="0"/>
+              </a:rPr>
+              <a:t> </a:t>
+            </a:r>
+            <a:r>
+              <a:rPr lang="en-US" sz="1800" dirty="0" err="1" smtClean="0">
+                <a:latin typeface="Consolas" panose="020B0609020204030204" pitchFamily="49" charset="0"/>
+                <a:cs typeface="Courier New" panose="02070309020205020404" pitchFamily="49" charset="0"/>
+              </a:rPr>
+              <a:t>above_hyst</a:t>
+            </a:r>
+            <a:r>
+              <a:rPr lang="en-US" sz="1800" b="1" dirty="0" smtClean="0">
+                <a:solidFill>
+                  <a:srgbClr val="920049"/>
+                </a:solidFill>
+                <a:latin typeface="Consolas" panose="020B0609020204030204" pitchFamily="49" charset="0"/>
+                <a:cs typeface="Courier New" panose="02070309020205020404" pitchFamily="49" charset="0"/>
+              </a:rPr>
+              <a:t>)</a:t>
+            </a:r>
+            <a:r>
+              <a:rPr lang="en-US" sz="1800" dirty="0" smtClean="0">
+                <a:latin typeface="Consolas" panose="020B0609020204030204" pitchFamily="49" charset="0"/>
+                <a:cs typeface="Courier New" panose="02070309020205020404" pitchFamily="49" charset="0"/>
+              </a:rPr>
+              <a:t/>
+            </a:r>
+            <a:br>
+              <a:rPr lang="en-US" sz="1800" dirty="0" smtClean="0">
+                <a:latin typeface="Consolas" panose="020B0609020204030204" pitchFamily="49" charset="0"/>
+                <a:cs typeface="Courier New" panose="02070309020205020404" pitchFamily="49" charset="0"/>
+              </a:rPr>
+            </a:br>
+            <a:r>
+              <a:rPr lang="en-US" sz="1800" dirty="0" smtClean="0">
+                <a:latin typeface="Consolas" panose="020B0609020204030204" pitchFamily="49" charset="0"/>
+                <a:cs typeface="Courier New" panose="02070309020205020404" pitchFamily="49" charset="0"/>
+              </a:rPr>
+              <a:t>              </a:t>
+            </a:r>
+            <a:r>
+              <a:rPr lang="en-US" sz="1800" b="1" dirty="0" smtClean="0">
+                <a:solidFill>
+                  <a:srgbClr val="920049"/>
+                </a:solidFill>
+                <a:latin typeface="Consolas" panose="020B0609020204030204" pitchFamily="49" charset="0"/>
+                <a:cs typeface="Courier New" panose="02070309020205020404" pitchFamily="49" charset="0"/>
+              </a:rPr>
+              <a:t>then </a:t>
+            </a:r>
+            <a:r>
+              <a:rPr lang="en-US" sz="1800" b="1" dirty="0">
+                <a:solidFill>
+                  <a:srgbClr val="920049"/>
+                </a:solidFill>
+                <a:latin typeface="Consolas" panose="020B0609020204030204" pitchFamily="49" charset="0"/>
+                <a:cs typeface="Courier New" panose="02070309020205020404" pitchFamily="49" charset="0"/>
+              </a:rPr>
+              <a:t>false else </a:t>
+            </a:r>
+            <a:r>
+              <a:rPr lang="en-US" sz="1800" dirty="0">
+                <a:latin typeface="Consolas" panose="020B0609020204030204" pitchFamily="49" charset="0"/>
+                <a:cs typeface="Courier New" panose="02070309020205020404" pitchFamily="49" charset="0"/>
+              </a:rPr>
+              <a:t>d2</a:t>
+            </a:r>
+            <a:r>
+              <a:rPr lang="en-US" sz="1800" b="1" dirty="0">
+                <a:solidFill>
+                  <a:srgbClr val="920049"/>
+                </a:solidFill>
+                <a:latin typeface="Consolas" panose="020B0609020204030204" pitchFamily="49" charset="0"/>
+                <a:cs typeface="Courier New" panose="02070309020205020404" pitchFamily="49" charset="0"/>
+              </a:rPr>
+              <a:t>;</a:t>
+            </a:r>
+          </a:p>
+          <a:p>
+            <a:pPr marL="0" indent="0">
+              <a:lnSpc>
+                <a:spcPct val="120000"/>
+              </a:lnSpc>
+              <a:spcBef>
+                <a:spcPts val="400"/>
+              </a:spcBef>
+              <a:buNone/>
+            </a:pPr>
+            <a:r>
+              <a:rPr lang="en-US" sz="1800" dirty="0" smtClean="0">
+                <a:latin typeface="Consolas" panose="020B0609020204030204" pitchFamily="49" charset="0"/>
+                <a:cs typeface="Courier New" panose="02070309020205020404" pitchFamily="49" charset="0"/>
+              </a:rPr>
+              <a:t>	 d2 </a:t>
+            </a:r>
+            <a:r>
+              <a:rPr lang="en-US" sz="1800" b="1" dirty="0">
+                <a:solidFill>
+                  <a:srgbClr val="920049"/>
+                </a:solidFill>
+                <a:latin typeface="Consolas" panose="020B0609020204030204" pitchFamily="49" charset="0"/>
+                <a:cs typeface="Courier New" panose="02070309020205020404" pitchFamily="49" charset="0"/>
+              </a:rPr>
+              <a:t>= (false -&gt; pre(</a:t>
+            </a:r>
+            <a:r>
+              <a:rPr lang="en-US" sz="1800" dirty="0" err="1">
+                <a:latin typeface="Consolas" panose="020B0609020204030204" pitchFamily="49" charset="0"/>
+                <a:cs typeface="Courier New" panose="02070309020205020404" pitchFamily="49" charset="0"/>
+              </a:rPr>
+              <a:t>doi_on</a:t>
+            </a:r>
+            <a:r>
+              <a:rPr lang="en-US" sz="1800" b="1" dirty="0">
+                <a:solidFill>
+                  <a:srgbClr val="920049"/>
+                </a:solidFill>
+                <a:latin typeface="Consolas" panose="020B0609020204030204" pitchFamily="49" charset="0"/>
+                <a:cs typeface="Courier New" panose="02070309020205020404" pitchFamily="49" charset="0"/>
+              </a:rPr>
+              <a:t>));</a:t>
+            </a:r>
+            <a:r>
+              <a:rPr lang="en-US" sz="1800" dirty="0">
+                <a:latin typeface="Consolas" panose="020B0609020204030204" pitchFamily="49" charset="0"/>
+                <a:cs typeface="Courier New" panose="02070309020205020404" pitchFamily="49" charset="0"/>
+              </a:rPr>
+              <a:t> </a:t>
+            </a:r>
+            <a:r>
+              <a:rPr lang="en-US" sz="1800" dirty="0" smtClean="0">
+                <a:latin typeface="Consolas" panose="020B0609020204030204" pitchFamily="49" charset="0"/>
+                <a:cs typeface="Courier New" panose="02070309020205020404" pitchFamily="49" charset="0"/>
+              </a:rPr>
+              <a:t>         </a:t>
+            </a:r>
+            <a:endParaRPr lang="en-US" sz="1800" dirty="0">
+              <a:latin typeface="Consolas" panose="020B0609020204030204" pitchFamily="49" charset="0"/>
+              <a:cs typeface="Courier New" panose="02070309020205020404" pitchFamily="49" charset="0"/>
+            </a:endParaRPr>
+          </a:p>
+          <a:p>
+            <a:pPr marL="0" indent="0">
+              <a:lnSpc>
+                <a:spcPct val="120000"/>
+              </a:lnSpc>
+              <a:spcBef>
+                <a:spcPts val="400"/>
+              </a:spcBef>
+              <a:buNone/>
+            </a:pPr>
+            <a:r>
+              <a:rPr lang="en-US" sz="1800" dirty="0">
+                <a:latin typeface="Consolas" panose="020B0609020204030204" pitchFamily="49" charset="0"/>
+                <a:cs typeface="Courier New" panose="02070309020205020404" pitchFamily="49" charset="0"/>
+              </a:rPr>
+              <a:t> </a:t>
+            </a:r>
+            <a:r>
+              <a:rPr lang="en-US" sz="1800" dirty="0" smtClean="0">
+                <a:latin typeface="Consolas" panose="020B0609020204030204" pitchFamily="49" charset="0"/>
+                <a:cs typeface="Courier New" panose="02070309020205020404" pitchFamily="49" charset="0"/>
+              </a:rPr>
+              <a:t>    </a:t>
+            </a:r>
+            <a:r>
+              <a:rPr lang="en-US" sz="1800" b="1" dirty="0" err="1" smtClean="0">
+                <a:solidFill>
+                  <a:srgbClr val="920049"/>
+                </a:solidFill>
+                <a:latin typeface="Consolas" panose="020B0609020204030204" pitchFamily="49" charset="0"/>
+                <a:cs typeface="Courier New" panose="02070309020205020404" pitchFamily="49" charset="0"/>
+              </a:rPr>
+              <a:t>tel</a:t>
+            </a:r>
+            <a:r>
+              <a:rPr lang="en-US" sz="1800" dirty="0">
+                <a:solidFill>
+                  <a:srgbClr val="920049"/>
+                </a:solidFill>
+                <a:latin typeface="Consolas" panose="020B0609020204030204" pitchFamily="49" charset="0"/>
+                <a:cs typeface="Courier New" panose="02070309020205020404" pitchFamily="49" charset="0"/>
+              </a:rPr>
+              <a:t>;</a:t>
+            </a:r>
+          </a:p>
+        </p:txBody>
+      </p:sp>
+      <p:sp>
+        <p:nvSpPr>
+          <p:cNvPr id="7" name="Rectangle 6"/>
+          <p:cNvSpPr/>
+          <p:nvPr/>
+        </p:nvSpPr>
+        <p:spPr>
+          <a:xfrm>
+            <a:off x="1106424" y="129396"/>
+            <a:ext cx="6600376" cy="6941255"/>
+          </a:xfrm>
+          <a:prstGeom prst="rect">
+            <a:avLst/>
+          </a:prstGeom>
+          <a:noFill/>
+          <a:ln>
+            <a:solidFill>
+              <a:schemeClr val="tx1"/>
+            </a:solidFill>
+          </a:ln>
+        </p:spPr>
+        <p:style>
+          <a:lnRef idx="2">
+            <a:schemeClr val="accent1">
+              <a:shade val="50000"/>
+            </a:schemeClr>
+          </a:lnRef>
+          <a:fillRef idx="1">
+            <a:schemeClr val="accent1"/>
+          </a:fillRef>
+          <a:effectRef idx="0">
+            <a:schemeClr val="accent1"/>
+          </a:effectRef>
+          <a:fontRef idx="minor">
+            <a:schemeClr val="lt1"/>
+          </a:fontRef>
+        </p:style>
+        <p:txBody>
+          <a:bodyPr rtlCol="0" anchor="ctr"/>
+          <a:lstStyle/>
+          <a:p>
+            <a:pPr algn="ctr"/>
+            <a:endParaRPr lang="en-US">
+              <a:latin typeface="Consolas" panose="020B0609020204030204" pitchFamily="49" charset="0"/>
+              <a:cs typeface="Courier New" panose="02070309020205020404" pitchFamily="49" charset="0"/>
+            </a:endParaRPr>
+          </a:p>
+        </p:txBody>
+      </p:sp>
+      <p:sp>
+        <p:nvSpPr>
+          <p:cNvPr id="8" name="Rectangle 7"/>
+          <p:cNvSpPr/>
+          <p:nvPr/>
+        </p:nvSpPr>
+        <p:spPr>
+          <a:xfrm>
+            <a:off x="1246588" y="2613547"/>
+            <a:ext cx="521297" cy="338554"/>
+          </a:xfrm>
+          <a:prstGeom prst="rect">
+            <a:avLst/>
+          </a:prstGeom>
+        </p:spPr>
+        <p:txBody>
+          <a:bodyPr wrap="none">
+            <a:spAutoFit/>
+          </a:bodyPr>
+          <a:lstStyle/>
+          <a:p>
+            <a:r>
+              <a:rPr lang="en-US" sz="1600" dirty="0">
+                <a:solidFill>
+                  <a:prstClr val="black"/>
+                </a:solidFill>
+                <a:latin typeface="Consolas" panose="020B0609020204030204" pitchFamily="49" charset="0"/>
+                <a:cs typeface="Courier New" panose="02070309020205020404" pitchFamily="49" charset="0"/>
+              </a:rPr>
+              <a:t>(1)</a:t>
+            </a:r>
+            <a:endParaRPr lang="en-US" sz="1600" dirty="0">
+              <a:latin typeface="Consolas" panose="020B0609020204030204" pitchFamily="49" charset="0"/>
+            </a:endParaRPr>
+          </a:p>
+        </p:txBody>
+      </p:sp>
+      <p:sp>
+        <p:nvSpPr>
+          <p:cNvPr id="9" name="Rectangle 8"/>
+          <p:cNvSpPr/>
+          <p:nvPr/>
+        </p:nvSpPr>
+        <p:spPr>
+          <a:xfrm>
+            <a:off x="1246588" y="2955004"/>
+            <a:ext cx="521297" cy="338554"/>
+          </a:xfrm>
+          <a:prstGeom prst="rect">
+            <a:avLst/>
+          </a:prstGeom>
+        </p:spPr>
+        <p:txBody>
+          <a:bodyPr wrap="none">
+            <a:spAutoFit/>
+          </a:bodyPr>
+          <a:lstStyle/>
+          <a:p>
+            <a:r>
+              <a:rPr lang="en-US" sz="1600" dirty="0" smtClean="0">
+                <a:solidFill>
+                  <a:prstClr val="black"/>
+                </a:solidFill>
+                <a:latin typeface="Consolas" panose="020B0609020204030204" pitchFamily="49" charset="0"/>
+                <a:cs typeface="Courier New" panose="02070309020205020404" pitchFamily="49" charset="0"/>
+              </a:rPr>
+              <a:t>(2)</a:t>
+            </a:r>
+            <a:endParaRPr lang="en-US" sz="1600" dirty="0">
+              <a:latin typeface="Consolas" panose="020B0609020204030204" pitchFamily="49" charset="0"/>
+            </a:endParaRPr>
+          </a:p>
+        </p:txBody>
+      </p:sp>
+      <p:sp>
+        <p:nvSpPr>
+          <p:cNvPr id="10" name="Rectangle 9"/>
+          <p:cNvSpPr/>
+          <p:nvPr/>
+        </p:nvSpPr>
+        <p:spPr>
+          <a:xfrm>
+            <a:off x="1238098" y="3311787"/>
+            <a:ext cx="521297" cy="338554"/>
+          </a:xfrm>
+          <a:prstGeom prst="rect">
+            <a:avLst/>
+          </a:prstGeom>
+        </p:spPr>
+        <p:txBody>
+          <a:bodyPr wrap="none">
+            <a:spAutoFit/>
+          </a:bodyPr>
+          <a:lstStyle/>
+          <a:p>
+            <a:r>
+              <a:rPr lang="en-US" sz="1600" dirty="0" smtClean="0">
+                <a:solidFill>
+                  <a:prstClr val="black"/>
+                </a:solidFill>
+                <a:latin typeface="Consolas" panose="020B0609020204030204" pitchFamily="49" charset="0"/>
+                <a:cs typeface="Courier New" panose="02070309020205020404" pitchFamily="49" charset="0"/>
+              </a:rPr>
+              <a:t>(3)</a:t>
+            </a:r>
+            <a:endParaRPr lang="en-US" sz="1600" dirty="0">
+              <a:latin typeface="Consolas" panose="020B0609020204030204" pitchFamily="49" charset="0"/>
+            </a:endParaRPr>
+          </a:p>
+        </p:txBody>
+      </p:sp>
+      <p:sp>
+        <p:nvSpPr>
+          <p:cNvPr id="11" name="Rectangle 10"/>
+          <p:cNvSpPr/>
+          <p:nvPr/>
+        </p:nvSpPr>
+        <p:spPr>
+          <a:xfrm>
+            <a:off x="1246587" y="3692245"/>
+            <a:ext cx="521297" cy="338554"/>
+          </a:xfrm>
+          <a:prstGeom prst="rect">
+            <a:avLst/>
+          </a:prstGeom>
+        </p:spPr>
+        <p:txBody>
+          <a:bodyPr wrap="none">
+            <a:spAutoFit/>
+          </a:bodyPr>
+          <a:lstStyle/>
+          <a:p>
+            <a:r>
+              <a:rPr lang="en-US" sz="1600" dirty="0" smtClean="0">
+                <a:solidFill>
+                  <a:prstClr val="black"/>
+                </a:solidFill>
+                <a:latin typeface="Consolas" panose="020B0609020204030204" pitchFamily="49" charset="0"/>
+                <a:cs typeface="Courier New" panose="02070309020205020404" pitchFamily="49" charset="0"/>
+              </a:rPr>
+              <a:t>(4)</a:t>
+            </a:r>
+            <a:endParaRPr lang="en-US" sz="1600" dirty="0">
+              <a:latin typeface="Consolas" panose="020B0609020204030204" pitchFamily="49" charset="0"/>
+            </a:endParaRPr>
+          </a:p>
+        </p:txBody>
+      </p:sp>
+      <p:sp>
+        <p:nvSpPr>
+          <p:cNvPr id="12" name="Rectangle 11"/>
+          <p:cNvSpPr/>
+          <p:nvPr/>
+        </p:nvSpPr>
+        <p:spPr>
+          <a:xfrm>
+            <a:off x="1238098" y="4085510"/>
+            <a:ext cx="521297" cy="338554"/>
+          </a:xfrm>
+          <a:prstGeom prst="rect">
+            <a:avLst/>
+          </a:prstGeom>
+        </p:spPr>
+        <p:txBody>
+          <a:bodyPr wrap="none">
+            <a:spAutoFit/>
+          </a:bodyPr>
+          <a:lstStyle/>
+          <a:p>
+            <a:r>
+              <a:rPr lang="en-US" sz="1600" dirty="0" smtClean="0">
+                <a:solidFill>
+                  <a:prstClr val="black"/>
+                </a:solidFill>
+                <a:latin typeface="Consolas" panose="020B0609020204030204" pitchFamily="49" charset="0"/>
+                <a:cs typeface="Courier New" panose="02070309020205020404" pitchFamily="49" charset="0"/>
+              </a:rPr>
+              <a:t>(5)</a:t>
+            </a:r>
+            <a:endParaRPr lang="en-US" sz="1600" dirty="0">
+              <a:latin typeface="Consolas" panose="020B0609020204030204" pitchFamily="49" charset="0"/>
+            </a:endParaRPr>
+          </a:p>
+        </p:txBody>
+      </p:sp>
+      <p:sp>
+        <p:nvSpPr>
+          <p:cNvPr id="13" name="Rectangle 12"/>
+          <p:cNvSpPr/>
+          <p:nvPr/>
+        </p:nvSpPr>
+        <p:spPr>
+          <a:xfrm>
+            <a:off x="1246587" y="4465968"/>
+            <a:ext cx="521297" cy="338554"/>
+          </a:xfrm>
+          <a:prstGeom prst="rect">
+            <a:avLst/>
+          </a:prstGeom>
+        </p:spPr>
+        <p:txBody>
+          <a:bodyPr wrap="none">
+            <a:spAutoFit/>
+          </a:bodyPr>
+          <a:lstStyle/>
+          <a:p>
+            <a:r>
+              <a:rPr lang="en-US" sz="1600" dirty="0" smtClean="0">
+                <a:solidFill>
+                  <a:prstClr val="black"/>
+                </a:solidFill>
+                <a:latin typeface="Consolas" panose="020B0609020204030204" pitchFamily="49" charset="0"/>
+                <a:cs typeface="Courier New" panose="02070309020205020404" pitchFamily="49" charset="0"/>
+              </a:rPr>
+              <a:t>(6)</a:t>
+            </a:r>
+            <a:endParaRPr lang="en-US" sz="1600" dirty="0">
+              <a:latin typeface="Consolas" panose="020B0609020204030204" pitchFamily="49" charset="0"/>
+            </a:endParaRPr>
+          </a:p>
+        </p:txBody>
+      </p:sp>
+      <p:sp>
+        <p:nvSpPr>
+          <p:cNvPr id="14" name="Rectangle 13"/>
+          <p:cNvSpPr/>
+          <p:nvPr/>
+        </p:nvSpPr>
+        <p:spPr>
+          <a:xfrm>
+            <a:off x="1246587" y="4816046"/>
+            <a:ext cx="521297" cy="338554"/>
+          </a:xfrm>
+          <a:prstGeom prst="rect">
+            <a:avLst/>
+          </a:prstGeom>
+        </p:spPr>
+        <p:txBody>
+          <a:bodyPr wrap="none">
+            <a:spAutoFit/>
+          </a:bodyPr>
+          <a:lstStyle/>
+          <a:p>
+            <a:r>
+              <a:rPr lang="en-US" sz="1600" dirty="0" smtClean="0">
+                <a:solidFill>
+                  <a:prstClr val="black"/>
+                </a:solidFill>
+                <a:latin typeface="Consolas" panose="020B0609020204030204" pitchFamily="49" charset="0"/>
+                <a:cs typeface="Courier New" panose="02070309020205020404" pitchFamily="49" charset="0"/>
+              </a:rPr>
+              <a:t>(7)</a:t>
+            </a:r>
+            <a:endParaRPr lang="en-US" sz="1600" dirty="0">
+              <a:latin typeface="Consolas" panose="020B0609020204030204" pitchFamily="49" charset="0"/>
+            </a:endParaRPr>
+          </a:p>
+        </p:txBody>
+      </p:sp>
+      <p:sp>
+        <p:nvSpPr>
+          <p:cNvPr id="15" name="Rectangle 14"/>
+          <p:cNvSpPr/>
+          <p:nvPr/>
+        </p:nvSpPr>
+        <p:spPr>
+          <a:xfrm>
+            <a:off x="1246587" y="5535058"/>
+            <a:ext cx="521297" cy="338554"/>
+          </a:xfrm>
+          <a:prstGeom prst="rect">
+            <a:avLst/>
+          </a:prstGeom>
+        </p:spPr>
+        <p:txBody>
+          <a:bodyPr wrap="none">
+            <a:spAutoFit/>
+          </a:bodyPr>
+          <a:lstStyle/>
+          <a:p>
+            <a:r>
+              <a:rPr lang="en-US" sz="1600" dirty="0" smtClean="0">
+                <a:solidFill>
+                  <a:prstClr val="black"/>
+                </a:solidFill>
+                <a:latin typeface="Consolas" panose="020B0609020204030204" pitchFamily="49" charset="0"/>
+                <a:cs typeface="Courier New" panose="02070309020205020404" pitchFamily="49" charset="0"/>
+              </a:rPr>
+              <a:t>(8)</a:t>
+            </a:r>
+            <a:endParaRPr lang="en-US" sz="1600" dirty="0">
+              <a:latin typeface="Consolas" panose="020B0609020204030204" pitchFamily="49" charset="0"/>
+            </a:endParaRPr>
+          </a:p>
+        </p:txBody>
+      </p:sp>
+      <p:sp>
+        <p:nvSpPr>
+          <p:cNvPr id="16" name="Rectangle 15"/>
+          <p:cNvSpPr/>
+          <p:nvPr/>
+        </p:nvSpPr>
+        <p:spPr>
+          <a:xfrm>
+            <a:off x="1246587" y="6183555"/>
+            <a:ext cx="521297" cy="338554"/>
+          </a:xfrm>
+          <a:prstGeom prst="rect">
+            <a:avLst/>
+          </a:prstGeom>
+        </p:spPr>
+        <p:txBody>
+          <a:bodyPr wrap="none">
+            <a:spAutoFit/>
+          </a:bodyPr>
+          <a:lstStyle/>
+          <a:p>
+            <a:r>
+              <a:rPr lang="en-US" sz="1600" dirty="0" smtClean="0">
+                <a:solidFill>
+                  <a:prstClr val="black"/>
+                </a:solidFill>
+                <a:latin typeface="Consolas" panose="020B0609020204030204" pitchFamily="49" charset="0"/>
+                <a:cs typeface="Courier New" panose="02070309020205020404" pitchFamily="49" charset="0"/>
+              </a:rPr>
+              <a:t>(9)</a:t>
+            </a:r>
+            <a:endParaRPr lang="en-US" sz="1600" dirty="0">
+              <a:latin typeface="Consolas" panose="020B0609020204030204" pitchFamily="49" charset="0"/>
+            </a:endParaRPr>
+          </a:p>
+        </p:txBody>
+      </p:sp>
+    </p:spTree>
+    <p:extLst>
+      <p:ext uri="{BB962C8B-B14F-4D97-AF65-F5344CB8AC3E}">
+        <p14:creationId xmlns:p14="http://schemas.microsoft.com/office/powerpoint/2010/main" val="2632286701"/>
+      </p:ext>
+    </p:extLst>
+  </p:cSld>
+  <p:clrMapOvr>
+    <a:masterClrMapping/>
+  </p:clrMapOvr>
+</p:sld>
+</file>
+
+<file path=ppt/slides/slide6.xml><?xml version="1.0" encoding="utf-8"?>
 <p:sld xmlns:a="http://schemas.openxmlformats.org/drawingml/2006/main" xmlns:r="http://schemas.openxmlformats.org/officeDocument/2006/relationships" xmlns:p="http://schemas.openxmlformats.org/presentationml/2006/main">
   <p:cSld>
     <p:spTree>
@@ -7745,7 +10250,7 @@
 </p:sld>
 </file>
 
-<file path=ppt/slides/slide6.xml><?xml version="1.0" encoding="utf-8"?>
+<file path=ppt/slides/slide7.xml><?xml version="1.0" encoding="utf-8"?>
 <p:sld xmlns:a="http://schemas.openxmlformats.org/drawingml/2006/main" xmlns:r="http://schemas.openxmlformats.org/officeDocument/2006/relationships" xmlns:p="http://schemas.openxmlformats.org/presentationml/2006/main">
   <p:cSld>
     <p:spTree>
@@ -9257,7 +11762,7 @@
 </p:sld>
 </file>
 
-<file path=ppt/slides/slide7.xml><?xml version="1.0" encoding="utf-8"?>
+<file path=ppt/slides/slide8.xml><?xml version="1.0" encoding="utf-8"?>
 <p:sld xmlns:a="http://schemas.openxmlformats.org/drawingml/2006/main" xmlns:r="http://schemas.openxmlformats.org/officeDocument/2006/relationships" xmlns:p="http://schemas.openxmlformats.org/presentationml/2006/main">
   <p:cSld>
     <p:spTree>
@@ -10197,7 +12702,7 @@
 </p:sld>
 </file>
 
-<file path=ppt/slides/slide8.xml><?xml version="1.0" encoding="utf-8"?>
+<file path=ppt/slides/slide9.xml><?xml version="1.0" encoding="utf-8"?>
 <p:sld xmlns:a="http://schemas.openxmlformats.org/drawingml/2006/main" xmlns:r="http://schemas.openxmlformats.org/officeDocument/2006/relationships" xmlns:p="http://schemas.openxmlformats.org/presentationml/2006/main">
   <p:cSld>
     <p:spTree>
@@ -10713,220 +13218,6 @@
 </p:sld>
 </file>
 
-<file path=ppt/slides/slide9.xml><?xml version="1.0" encoding="utf-8"?>
-<p:sld xmlns:a="http://schemas.openxmlformats.org/drawingml/2006/main" xmlns:r="http://schemas.openxmlformats.org/officeDocument/2006/relationships" xmlns:p="http://schemas.openxmlformats.org/presentationml/2006/main">
-  <p:cSld>
-    <p:spTree>
-      <p:nvGrpSpPr>
-        <p:cNvPr id="1" name=""/>
-        <p:cNvGrpSpPr/>
-        <p:nvPr/>
-      </p:nvGrpSpPr>
-      <p:grpSpPr>
-        <a:xfrm>
-          <a:off x="0" y="0"/>
-          <a:ext cx="0" cy="0"/>
-          <a:chOff x="0" y="0"/>
-          <a:chExt cx="0" cy="0"/>
-        </a:xfrm>
-      </p:grpSpPr>
-      <p:pic>
-        <p:nvPicPr>
-          <p:cNvPr id="3" name="Picture 2"/>
-          <p:cNvPicPr>
-            <a:picLocks noChangeAspect="1"/>
-          </p:cNvPicPr>
-          <p:nvPr/>
-        </p:nvPicPr>
-        <p:blipFill rotWithShape="1">
-          <a:blip r:embed="rId2">
-            <a:extLst>
-              <a:ext uri="{28A0092B-C50C-407E-A947-70E740481C1C}">
-                <a14:useLocalDpi xmlns:a14="http://schemas.microsoft.com/office/drawing/2010/main" val="0"/>
-              </a:ext>
-            </a:extLst>
-          </a:blip>
-          <a:srcRect b="515"/>
-          <a:stretch/>
-        </p:blipFill>
-        <p:spPr>
-          <a:xfrm>
-            <a:off x="543522" y="181282"/>
-            <a:ext cx="10853950" cy="6031259"/>
-          </a:xfrm>
-          <a:prstGeom prst="rect">
-            <a:avLst/>
-          </a:prstGeom>
-        </p:spPr>
-      </p:pic>
-      <p:pic>
-        <p:nvPicPr>
-          <p:cNvPr id="13" name="Picture 12"/>
-          <p:cNvPicPr>
-            <a:picLocks noChangeAspect="1"/>
-          </p:cNvPicPr>
-          <p:nvPr/>
-        </p:nvPicPr>
-        <p:blipFill>
-          <a:blip r:embed="rId3"/>
-          <a:stretch>
-            <a:fillRect/>
-          </a:stretch>
-        </p:blipFill>
-        <p:spPr>
-          <a:xfrm>
-            <a:off x="1052166" y="350221"/>
-            <a:ext cx="5595700" cy="2007498"/>
-          </a:xfrm>
-          <a:prstGeom prst="rect">
-            <a:avLst/>
-          </a:prstGeom>
-          <a:noFill/>
-        </p:spPr>
-      </p:pic>
-      <p:sp>
-        <p:nvSpPr>
-          <p:cNvPr id="15" name="Rectangle 14"/>
-          <p:cNvSpPr/>
-          <p:nvPr/>
-        </p:nvSpPr>
-        <p:spPr>
-          <a:xfrm rot="16200000">
-            <a:off x="10856907" y="2861552"/>
-            <a:ext cx="1419684" cy="430887"/>
-          </a:xfrm>
-          <a:prstGeom prst="rect">
-            <a:avLst/>
-          </a:prstGeom>
-          <a:noFill/>
-        </p:spPr>
-        <p:txBody>
-          <a:bodyPr wrap="none">
-            <a:spAutoFit/>
-          </a:bodyPr>
-          <a:lstStyle/>
-          <a:p>
-            <a:r>
-              <a:rPr lang="en-US" sz="2200" dirty="0" smtClean="0"/>
-              <a:t>#of  MIVCs</a:t>
-            </a:r>
-            <a:endParaRPr lang="en-US" sz="2200" dirty="0"/>
-          </a:p>
-        </p:txBody>
-      </p:sp>
-      <p:sp>
-        <p:nvSpPr>
-          <p:cNvPr id="22" name="Rectangle 21"/>
-          <p:cNvSpPr/>
-          <p:nvPr/>
-        </p:nvSpPr>
-        <p:spPr>
-          <a:xfrm>
-            <a:off x="5842837" y="6128277"/>
-            <a:ext cx="805029" cy="338554"/>
-          </a:xfrm>
-          <a:prstGeom prst="rect">
-            <a:avLst/>
-          </a:prstGeom>
-          <a:noFill/>
-        </p:spPr>
-        <p:txBody>
-          <a:bodyPr wrap="none">
-            <a:spAutoFit/>
-          </a:bodyPr>
-          <a:lstStyle/>
-          <a:p>
-            <a:r>
-              <a:rPr lang="en-US" sz="1600" dirty="0" smtClean="0"/>
-              <a:t>Models</a:t>
-            </a:r>
-            <a:endParaRPr lang="en-US" sz="1600" dirty="0"/>
-          </a:p>
-        </p:txBody>
-      </p:sp>
-      <p:sp>
-        <p:nvSpPr>
-          <p:cNvPr id="26" name="Rectangle 25"/>
-          <p:cNvSpPr/>
-          <p:nvPr/>
-        </p:nvSpPr>
-        <p:spPr>
-          <a:xfrm rot="16200000">
-            <a:off x="-122526" y="3212524"/>
-            <a:ext cx="1332096" cy="338554"/>
-          </a:xfrm>
-          <a:prstGeom prst="rect">
-            <a:avLst/>
-          </a:prstGeom>
-          <a:noFill/>
-        </p:spPr>
-        <p:txBody>
-          <a:bodyPr wrap="none">
-            <a:spAutoFit/>
-          </a:bodyPr>
-          <a:lstStyle/>
-          <a:p>
-            <a:r>
-              <a:rPr lang="en-US" sz="1600" dirty="0" smtClean="0"/>
-              <a:t>Runtime (sec)</a:t>
-            </a:r>
-            <a:endParaRPr lang="en-US" sz="1600" dirty="0"/>
-          </a:p>
-        </p:txBody>
-      </p:sp>
-      <p:sp>
-        <p:nvSpPr>
-          <p:cNvPr id="2" name="TextBox 1"/>
-          <p:cNvSpPr txBox="1"/>
-          <p:nvPr/>
-        </p:nvSpPr>
-        <p:spPr>
-          <a:xfrm>
-            <a:off x="2304527" y="1851795"/>
-            <a:ext cx="1066201" cy="400110"/>
-          </a:xfrm>
-          <a:prstGeom prst="rect">
-            <a:avLst/>
-          </a:prstGeom>
-          <a:solidFill>
-            <a:schemeClr val="bg1"/>
-          </a:solidFill>
-        </p:spPr>
-        <p:txBody>
-          <a:bodyPr wrap="square" rtlCol="0">
-            <a:spAutoFit/>
-          </a:bodyPr>
-          <a:lstStyle/>
-          <a:p>
-            <a:r>
-              <a:rPr lang="en-US" sz="2000" b="1" dirty="0" smtClean="0">
-                <a:solidFill>
-                  <a:srgbClr val="474747"/>
-                </a:solidFill>
-              </a:rPr>
-              <a:t>MIVCs</a:t>
-            </a:r>
-            <a:endParaRPr lang="en-US" sz="2000" b="1" dirty="0">
-              <a:solidFill>
-                <a:srgbClr val="474747"/>
-              </a:solidFill>
-            </a:endParaRPr>
-          </a:p>
-        </p:txBody>
-      </p:sp>
-    </p:spTree>
-    <p:extLst>
-      <p:ext uri="{BB962C8B-B14F-4D97-AF65-F5344CB8AC3E}">
-        <p14:creationId xmlns:p14="http://schemas.microsoft.com/office/powerpoint/2010/main" val="219871825"/>
-      </p:ext>
-    </p:extLst>
-  </p:cSld>
-  <p:clrMapOvr>
-    <a:masterClrMapping/>
-  </p:clrMapOvr>
-</p:sld>
-</file>
-
 <file path=ppt/theme/theme1.xml><?xml version="1.0" encoding="utf-8"?>
 <a:theme xmlns:a="http://schemas.openxmlformats.org/drawingml/2006/main" name="Office Theme">
   <a:themeElements>

</xml_diff>

<commit_message>
fix the TSE example
</commit_message>
<xml_diff>
--- a/TSE/TSE_TEX/figs/figs.pptx
+++ b/TSE/TSE_TEX/figs/figs.pptx
@@ -256,7 +256,7 @@
           <a:p>
             <a:fld id="{5A779009-EA30-43A9-A43B-F006CC3D9B84}" type="datetimeFigureOut">
               <a:rPr lang="en-US" smtClean="0"/>
-              <a:t>9/24/2017</a:t>
+              <a:t>10/26/2017</a:t>
             </a:fld>
             <a:endParaRPr lang="en-US"/>
           </a:p>
@@ -426,7 +426,7 @@
           <a:p>
             <a:fld id="{5A779009-EA30-43A9-A43B-F006CC3D9B84}" type="datetimeFigureOut">
               <a:rPr lang="en-US" smtClean="0"/>
-              <a:t>9/24/2017</a:t>
+              <a:t>10/26/2017</a:t>
             </a:fld>
             <a:endParaRPr lang="en-US"/>
           </a:p>
@@ -606,7 +606,7 @@
           <a:p>
             <a:fld id="{5A779009-EA30-43A9-A43B-F006CC3D9B84}" type="datetimeFigureOut">
               <a:rPr lang="en-US" smtClean="0"/>
-              <a:t>9/24/2017</a:t>
+              <a:t>10/26/2017</a:t>
             </a:fld>
             <a:endParaRPr lang="en-US"/>
           </a:p>
@@ -776,7 +776,7 @@
           <a:p>
             <a:fld id="{5A779009-EA30-43A9-A43B-F006CC3D9B84}" type="datetimeFigureOut">
               <a:rPr lang="en-US" smtClean="0"/>
-              <a:t>9/24/2017</a:t>
+              <a:t>10/26/2017</a:t>
             </a:fld>
             <a:endParaRPr lang="en-US"/>
           </a:p>
@@ -1022,7 +1022,7 @@
           <a:p>
             <a:fld id="{5A779009-EA30-43A9-A43B-F006CC3D9B84}" type="datetimeFigureOut">
               <a:rPr lang="en-US" smtClean="0"/>
-              <a:t>9/24/2017</a:t>
+              <a:t>10/26/2017</a:t>
             </a:fld>
             <a:endParaRPr lang="en-US"/>
           </a:p>
@@ -1254,7 +1254,7 @@
           <a:p>
             <a:fld id="{5A779009-EA30-43A9-A43B-F006CC3D9B84}" type="datetimeFigureOut">
               <a:rPr lang="en-US" smtClean="0"/>
-              <a:t>9/24/2017</a:t>
+              <a:t>10/26/2017</a:t>
             </a:fld>
             <a:endParaRPr lang="en-US"/>
           </a:p>
@@ -1621,7 +1621,7 @@
           <a:p>
             <a:fld id="{5A779009-EA30-43A9-A43B-F006CC3D9B84}" type="datetimeFigureOut">
               <a:rPr lang="en-US" smtClean="0"/>
-              <a:t>9/24/2017</a:t>
+              <a:t>10/26/2017</a:t>
             </a:fld>
             <a:endParaRPr lang="en-US"/>
           </a:p>
@@ -1739,7 +1739,7 @@
           <a:p>
             <a:fld id="{5A779009-EA30-43A9-A43B-F006CC3D9B84}" type="datetimeFigureOut">
               <a:rPr lang="en-US" smtClean="0"/>
-              <a:t>9/24/2017</a:t>
+              <a:t>10/26/2017</a:t>
             </a:fld>
             <a:endParaRPr lang="en-US"/>
           </a:p>
@@ -1834,7 +1834,7 @@
           <a:p>
             <a:fld id="{5A779009-EA30-43A9-A43B-F006CC3D9B84}" type="datetimeFigureOut">
               <a:rPr lang="en-US" smtClean="0"/>
-              <a:t>9/24/2017</a:t>
+              <a:t>10/26/2017</a:t>
             </a:fld>
             <a:endParaRPr lang="en-US"/>
           </a:p>
@@ -2111,7 +2111,7 @@
           <a:p>
             <a:fld id="{5A779009-EA30-43A9-A43B-F006CC3D9B84}" type="datetimeFigureOut">
               <a:rPr lang="en-US" smtClean="0"/>
-              <a:t>9/24/2017</a:t>
+              <a:t>10/26/2017</a:t>
             </a:fld>
             <a:endParaRPr lang="en-US"/>
           </a:p>
@@ -2364,7 +2364,7 @@
           <a:p>
             <a:fld id="{5A779009-EA30-43A9-A43B-F006CC3D9B84}" type="datetimeFigureOut">
               <a:rPr lang="en-US" smtClean="0"/>
-              <a:t>9/24/2017</a:t>
+              <a:t>10/26/2017</a:t>
             </a:fld>
             <a:endParaRPr lang="en-US"/>
           </a:p>
@@ -2577,7 +2577,7 @@
           <a:p>
             <a:fld id="{5A779009-EA30-43A9-A43B-F006CC3D9B84}" type="datetimeFigureOut">
               <a:rPr lang="en-US" smtClean="0"/>
-              <a:t>9/24/2017</a:t>
+              <a:t>10/26/2017</a:t>
             </a:fld>
             <a:endParaRPr lang="en-US"/>
           </a:p>
@@ -3500,11 +3500,7 @@
           <a:p>
             <a:r>
               <a:rPr lang="en-US" sz="1600" dirty="0" smtClean="0"/>
-              <a:t>#of </a:t>
-            </a:r>
-            <a:r>
-              <a:rPr lang="en-US" sz="1600" dirty="0" smtClean="0"/>
-              <a:t>covered model elements</a:t>
+              <a:t>#of covered model elements</a:t>
             </a:r>
             <a:endParaRPr lang="en-US" sz="1600" dirty="0"/>
           </a:p>
@@ -4513,8 +4509,8 @@
         </p:nvSpPr>
         <p:spPr>
           <a:xfrm>
-            <a:off x="3537786" y="4017587"/>
-            <a:ext cx="338554" cy="400110"/>
+            <a:off x="3151987" y="4410942"/>
+            <a:ext cx="1313180" cy="400110"/>
           </a:xfrm>
           <a:prstGeom prst="rect">
             <a:avLst/>
@@ -4534,7 +4530,14 @@
                 <a:latin typeface="Consolas" panose="020B0609020204030204" pitchFamily="49" charset="0"/>
                 <a:cs typeface="Courier New" panose="02070309020205020404" pitchFamily="49" charset="0"/>
               </a:rPr>
-              <a:t>P</a:t>
+              <a:t>P = </a:t>
+            </a:r>
+            <a:r>
+              <a:rPr lang="en-US" sz="2000" dirty="0" err="1" smtClean="0">
+                <a:latin typeface="Consolas" panose="020B0609020204030204" pitchFamily="49" charset="0"/>
+                <a:cs typeface="Courier New" panose="02070309020205020404" pitchFamily="49" charset="0"/>
+              </a:rPr>
+              <a:t>on_p</a:t>
             </a:r>
             <a:endParaRPr lang="en-US" sz="2000" dirty="0">
               <a:latin typeface="Consolas" panose="020B0609020204030204" pitchFamily="49" charset="0"/>
@@ -4551,8 +4554,8 @@
         </p:nvSpPr>
         <p:spPr>
           <a:xfrm>
-            <a:off x="4893943" y="2575238"/>
-            <a:ext cx="1324402" cy="369332"/>
+            <a:off x="5031186" y="2527556"/>
+            <a:ext cx="817853" cy="369332"/>
           </a:xfrm>
           <a:prstGeom prst="rect">
             <a:avLst/>
@@ -4565,11 +4568,11 @@
           <a:lstStyle/>
           <a:p>
             <a:r>
-              <a:rPr lang="en-US" dirty="0" err="1" smtClean="0">
-                <a:latin typeface="Consolas" panose="020B0609020204030204" pitchFamily="49" charset="0"/>
-                <a:cs typeface="Courier New" panose="02070309020205020404" pitchFamily="49" charset="0"/>
-              </a:rPr>
-              <a:t>one_below</a:t>
+              <a:rPr lang="en-US" dirty="0" smtClean="0">
+                <a:latin typeface="Consolas" panose="020B0609020204030204" pitchFamily="49" charset="0"/>
+                <a:cs typeface="Courier New" panose="02070309020205020404" pitchFamily="49" charset="0"/>
+              </a:rPr>
+              <a:t>below</a:t>
             </a:r>
             <a:endParaRPr lang="en-US" dirty="0">
               <a:latin typeface="Consolas" panose="020B0609020204030204" pitchFamily="49" charset="0"/>
@@ -4641,41 +4644,6 @@
               </a:rPr>
               <a:t>a1_below</a:t>
             </a:r>
-          </a:p>
-        </p:txBody>
-      </p:sp>
-      <p:sp>
-        <p:nvSpPr>
-          <p:cNvPr id="11" name="Rectangle 10"/>
-          <p:cNvSpPr/>
-          <p:nvPr/>
-        </p:nvSpPr>
-        <p:spPr>
-          <a:xfrm>
-            <a:off x="5118675" y="2145639"/>
-            <a:ext cx="1157044" cy="369332"/>
-          </a:xfrm>
-          <a:prstGeom prst="rect">
-            <a:avLst/>
-          </a:prstGeom>
-        </p:spPr>
-        <p:txBody>
-          <a:bodyPr wrap="square">
-            <a:spAutoFit/>
-          </a:bodyPr>
-          <a:lstStyle/>
-          <a:p>
-            <a:r>
-              <a:rPr lang="en-US" dirty="0" err="1" smtClean="0">
-                <a:latin typeface="Consolas" panose="020B0609020204030204" pitchFamily="49" charset="0"/>
-                <a:cs typeface="Courier New" panose="02070309020205020404" pitchFamily="49" charset="0"/>
-              </a:rPr>
-              <a:t>on_p</a:t>
-            </a:r>
-            <a:endParaRPr lang="en-US" dirty="0">
-              <a:latin typeface="Consolas" panose="020B0609020204030204" pitchFamily="49" charset="0"/>
-              <a:cs typeface="Courier New" panose="02070309020205020404" pitchFamily="49" charset="0"/>
-            </a:endParaRPr>
           </a:p>
         </p:txBody>
       </p:sp>
@@ -5107,7 +5075,7 @@
         </p:nvSpPr>
         <p:spPr>
           <a:xfrm>
-            <a:off x="7316473" y="2641589"/>
+            <a:off x="7323064" y="2495613"/>
             <a:ext cx="1451038" cy="369332"/>
           </a:xfrm>
           <a:prstGeom prst="rect">
@@ -5125,7 +5093,7 @@
                 <a:latin typeface="Consolas" panose="020B0609020204030204" pitchFamily="49" charset="0"/>
                 <a:cs typeface="Courier New" panose="02070309020205020404" pitchFamily="49" charset="0"/>
               </a:rPr>
-              <a:t>both_above</a:t>
+              <a:t>above_hyst</a:t>
             </a:r>
             <a:endParaRPr lang="en-US" dirty="0">
               <a:latin typeface="Consolas" panose="020B0609020204030204" pitchFamily="49" charset="0"/>
@@ -5264,6 +5232,41 @@
           </a:fontRef>
         </p:style>
       </p:cxnSp>
+      <p:sp>
+        <p:nvSpPr>
+          <p:cNvPr id="2" name="Rectangle 1"/>
+          <p:cNvSpPr/>
+          <p:nvPr/>
+        </p:nvSpPr>
+        <p:spPr>
+          <a:xfrm>
+            <a:off x="5665807" y="3961206"/>
+            <a:ext cx="1197764" cy="369332"/>
+          </a:xfrm>
+          <a:prstGeom prst="rect">
+            <a:avLst/>
+          </a:prstGeom>
+        </p:spPr>
+        <p:txBody>
+          <a:bodyPr wrap="none">
+            <a:spAutoFit/>
+          </a:bodyPr>
+          <a:lstStyle/>
+          <a:p>
+            <a:r>
+              <a:rPr lang="en-US" dirty="0" smtClean="0">
+                <a:latin typeface="Consolas" panose="020B0609020204030204" pitchFamily="49" charset="0"/>
+                <a:cs typeface="Courier New" panose="02070309020205020404" pitchFamily="49" charset="0"/>
+              </a:rPr>
+              <a:t>d1    d2</a:t>
+            </a:r>
+            <a:endParaRPr lang="en-US" dirty="0">
+              <a:latin typeface="Consolas" panose="020B0609020204030204" pitchFamily="49" charset="0"/>
+              <a:cs typeface="Courier New" panose="02070309020205020404" pitchFamily="49" charset="0"/>
+            </a:endParaRPr>
+          </a:p>
+        </p:txBody>
+      </p:sp>
     </p:spTree>
     <p:extLst>
       <p:ext uri="{BB962C8B-B14F-4D97-AF65-F5344CB8AC3E}">

</xml_diff>